<commit_message>
Modificacion de la clase 5
inicio de la clase 9
</commit_message>
<xml_diff>
--- a/Clases/Clase 5/Clase 5.pptx
+++ b/Clases/Clase 5/Clase 5.pptx
@@ -1,23 +1,27 @@
 
 <file path=ppt/presentation.xml><?xml version="1.0" encoding="utf-8"?>
-<p:presentation xmlns:a="http://schemas.openxmlformats.org/drawingml/2006/main" xmlns:r="http://schemas.openxmlformats.org/officeDocument/2006/relationships" xmlns:p="http://schemas.openxmlformats.org/presentationml/2006/main" saveSubsetFonts="1">
+<p:presentation xmlns:a="http://schemas.openxmlformats.org/drawingml/2006/main" xmlns:r="http://schemas.openxmlformats.org/officeDocument/2006/relationships" xmlns:p="http://schemas.openxmlformats.org/presentationml/2006/main">
   <p:sldMasterIdLst>
     <p:sldMasterId id="2147483648" r:id="rId1"/>
   </p:sldMasterIdLst>
   <p:sldIdLst>
-    <p:sldId id="256" r:id="rId2"/>
-    <p:sldId id="258" r:id="rId3"/>
-    <p:sldId id="257" r:id="rId4"/>
-    <p:sldId id="259" r:id="rId5"/>
-    <p:sldId id="262" r:id="rId6"/>
-    <p:sldId id="263" r:id="rId7"/>
-    <p:sldId id="260" r:id="rId8"/>
-    <p:sldId id="264" r:id="rId9"/>
-    <p:sldId id="265" r:id="rId10"/>
-    <p:sldId id="266" r:id="rId11"/>
-    <p:sldId id="267" r:id="rId12"/>
-    <p:sldId id="268" r:id="rId13"/>
-    <p:sldId id="269" r:id="rId14"/>
+    <p:sldId id="256" r:id="rId3"/>
+    <p:sldId id="258" r:id="rId4"/>
+    <p:sldId id="257" r:id="rId5"/>
+    <p:sldId id="259" r:id="rId6"/>
+    <p:sldId id="262" r:id="rId7"/>
+    <p:sldId id="263" r:id="rId8"/>
+    <p:sldId id="260" r:id="rId9"/>
+    <p:sldId id="264" r:id="rId10"/>
+    <p:sldId id="265" r:id="rId11"/>
+    <p:sldId id="266" r:id="rId12"/>
+    <p:sldId id="267" r:id="rId13"/>
+    <p:sldId id="268" r:id="rId14"/>
+    <p:sldId id="271" r:id="rId15"/>
+    <p:sldId id="274" r:id="rId16"/>
+    <p:sldId id="273" r:id="rId17"/>
+    <p:sldId id="272" r:id="rId18"/>
+    <p:sldId id="269" r:id="rId19"/>
   </p:sldIdLst>
   <p:sldSz cx="12192000" cy="6858000"/>
   <p:notesSz cx="6858000" cy="9144000"/>
@@ -116,11 +120,6 @@
       </a:defRPr>
     </a:lvl9pPr>
   </p:defaultTextStyle>
-  <p:extLst>
-    <p:ext uri="{EFAFB233-063F-42B5-8137-9DF3F51BA10A}">
-      <p15:sldGuideLst xmlns:p15="http://schemas.microsoft.com/office/powerpoint/2012/main"/>
-    </p:ext>
-  </p:extLst>
 </p:presentation>
 </file>
 
@@ -180,7 +179,7 @@
             <a:spLocks noGrp="1"/>
           </p:cNvSpPr>
           <p:nvPr>
-            <p:ph type="subTitle" idx="1"/>
+            <p:ph type="subTitle" idx="1" hasCustomPrompt="1"/>
           </p:nvPr>
         </p:nvSpPr>
         <p:spPr>
@@ -255,7 +254,6 @@
           <a:p>
             <a:fld id="{126F170E-E814-4B3B-A85B-D0CEE3E81FCB}" type="datetimeFigureOut">
               <a:rPr lang="es-MX" smtClean="0"/>
-              <a:t>15/01/2020</a:t>
             </a:fld>
             <a:endParaRPr lang="es-MX"/>
           </a:p>
@@ -297,18 +295,12 @@
           <a:p>
             <a:fld id="{7964CD6F-4211-4BE0-AF92-843C51BD8986}" type="slidenum">
               <a:rPr lang="es-MX" smtClean="0"/>
-              <a:t>‹Nº›</a:t>
             </a:fld>
             <a:endParaRPr lang="es-MX"/>
           </a:p>
         </p:txBody>
       </p:sp>
     </p:spTree>
-    <p:extLst>
-      <p:ext uri="{BB962C8B-B14F-4D97-AF65-F5344CB8AC3E}">
-        <p14:creationId xmlns:p14="http://schemas.microsoft.com/office/powerpoint/2010/main" val="833689074"/>
-      </p:ext>
-    </p:extLst>
   </p:cSld>
   <p:clrMapOvr>
     <a:masterClrMapping/>
@@ -363,7 +355,7 @@
             <a:spLocks noGrp="1"/>
           </p:cNvSpPr>
           <p:nvPr>
-            <p:ph type="body" orient="vert" idx="1"/>
+            <p:ph type="body" orient="vert" idx="1" hasCustomPrompt="1"/>
           </p:nvPr>
         </p:nvSpPr>
         <p:spPr/>
@@ -376,6 +368,7 @@
               <a:rPr lang="es-ES" smtClean="0"/>
               <a:t>Haga clic para modificar el estilo de texto del patrón</a:t>
             </a:r>
+            <a:endParaRPr lang="es-ES" smtClean="0"/>
           </a:p>
           <a:p>
             <a:pPr lvl="1"/>
@@ -383,6 +376,7 @@
               <a:rPr lang="es-ES" smtClean="0"/>
               <a:t>Segundo nivel</a:t>
             </a:r>
+            <a:endParaRPr lang="es-ES" smtClean="0"/>
           </a:p>
           <a:p>
             <a:pPr lvl="2"/>
@@ -390,6 +384,7 @@
               <a:rPr lang="es-ES" smtClean="0"/>
               <a:t>Tercer nivel</a:t>
             </a:r>
+            <a:endParaRPr lang="es-ES" smtClean="0"/>
           </a:p>
           <a:p>
             <a:pPr lvl="3"/>
@@ -397,6 +392,7 @@
               <a:rPr lang="es-ES" smtClean="0"/>
               <a:t>Cuarto nivel</a:t>
             </a:r>
+            <a:endParaRPr lang="es-ES" smtClean="0"/>
           </a:p>
           <a:p>
             <a:pPr lvl="4"/>
@@ -425,7 +421,6 @@
           <a:p>
             <a:fld id="{126F170E-E814-4B3B-A85B-D0CEE3E81FCB}" type="datetimeFigureOut">
               <a:rPr lang="es-MX" smtClean="0"/>
-              <a:t>15/01/2020</a:t>
             </a:fld>
             <a:endParaRPr lang="es-MX"/>
           </a:p>
@@ -467,18 +462,12 @@
           <a:p>
             <a:fld id="{7964CD6F-4211-4BE0-AF92-843C51BD8986}" type="slidenum">
               <a:rPr lang="es-MX" smtClean="0"/>
-              <a:t>‹Nº›</a:t>
             </a:fld>
             <a:endParaRPr lang="es-MX"/>
           </a:p>
         </p:txBody>
       </p:sp>
     </p:spTree>
-    <p:extLst>
-      <p:ext uri="{BB962C8B-B14F-4D97-AF65-F5344CB8AC3E}">
-        <p14:creationId xmlns:p14="http://schemas.microsoft.com/office/powerpoint/2010/main" val="3497168845"/>
-      </p:ext>
-    </p:extLst>
   </p:cSld>
   <p:clrMapOvr>
     <a:masterClrMapping/>
@@ -538,7 +527,7 @@
             <a:spLocks noGrp="1"/>
           </p:cNvSpPr>
           <p:nvPr>
-            <p:ph type="body" orient="vert" idx="1"/>
+            <p:ph type="body" orient="vert" idx="1" hasCustomPrompt="1"/>
           </p:nvPr>
         </p:nvSpPr>
         <p:spPr>
@@ -556,6 +545,7 @@
               <a:rPr lang="es-ES" smtClean="0"/>
               <a:t>Haga clic para modificar el estilo de texto del patrón</a:t>
             </a:r>
+            <a:endParaRPr lang="es-ES" smtClean="0"/>
           </a:p>
           <a:p>
             <a:pPr lvl="1"/>
@@ -563,6 +553,7 @@
               <a:rPr lang="es-ES" smtClean="0"/>
               <a:t>Segundo nivel</a:t>
             </a:r>
+            <a:endParaRPr lang="es-ES" smtClean="0"/>
           </a:p>
           <a:p>
             <a:pPr lvl="2"/>
@@ -570,6 +561,7 @@
               <a:rPr lang="es-ES" smtClean="0"/>
               <a:t>Tercer nivel</a:t>
             </a:r>
+            <a:endParaRPr lang="es-ES" smtClean="0"/>
           </a:p>
           <a:p>
             <a:pPr lvl="3"/>
@@ -577,6 +569,7 @@
               <a:rPr lang="es-ES" smtClean="0"/>
               <a:t>Cuarto nivel</a:t>
             </a:r>
+            <a:endParaRPr lang="es-ES" smtClean="0"/>
           </a:p>
           <a:p>
             <a:pPr lvl="4"/>
@@ -605,7 +598,6 @@
           <a:p>
             <a:fld id="{126F170E-E814-4B3B-A85B-D0CEE3E81FCB}" type="datetimeFigureOut">
               <a:rPr lang="es-MX" smtClean="0"/>
-              <a:t>15/01/2020</a:t>
             </a:fld>
             <a:endParaRPr lang="es-MX"/>
           </a:p>
@@ -647,18 +639,12 @@
           <a:p>
             <a:fld id="{7964CD6F-4211-4BE0-AF92-843C51BD8986}" type="slidenum">
               <a:rPr lang="es-MX" smtClean="0"/>
-              <a:t>‹Nº›</a:t>
             </a:fld>
             <a:endParaRPr lang="es-MX"/>
           </a:p>
         </p:txBody>
       </p:sp>
     </p:spTree>
-    <p:extLst>
-      <p:ext uri="{BB962C8B-B14F-4D97-AF65-F5344CB8AC3E}">
-        <p14:creationId xmlns:p14="http://schemas.microsoft.com/office/powerpoint/2010/main" val="3985976209"/>
-      </p:ext>
-    </p:extLst>
   </p:cSld>
   <p:clrMapOvr>
     <a:masterClrMapping/>
@@ -713,7 +699,7 @@
             <a:spLocks noGrp="1"/>
           </p:cNvSpPr>
           <p:nvPr>
-            <p:ph idx="1"/>
+            <p:ph idx="1" hasCustomPrompt="1"/>
           </p:nvPr>
         </p:nvSpPr>
         <p:spPr/>
@@ -726,6 +712,7 @@
               <a:rPr lang="es-ES" smtClean="0"/>
               <a:t>Haga clic para modificar el estilo de texto del patrón</a:t>
             </a:r>
+            <a:endParaRPr lang="es-ES" smtClean="0"/>
           </a:p>
           <a:p>
             <a:pPr lvl="1"/>
@@ -733,6 +720,7 @@
               <a:rPr lang="es-ES" smtClean="0"/>
               <a:t>Segundo nivel</a:t>
             </a:r>
+            <a:endParaRPr lang="es-ES" smtClean="0"/>
           </a:p>
           <a:p>
             <a:pPr lvl="2"/>
@@ -740,6 +728,7 @@
               <a:rPr lang="es-ES" smtClean="0"/>
               <a:t>Tercer nivel</a:t>
             </a:r>
+            <a:endParaRPr lang="es-ES" smtClean="0"/>
           </a:p>
           <a:p>
             <a:pPr lvl="3"/>
@@ -747,6 +736,7 @@
               <a:rPr lang="es-ES" smtClean="0"/>
               <a:t>Cuarto nivel</a:t>
             </a:r>
+            <a:endParaRPr lang="es-ES" smtClean="0"/>
           </a:p>
           <a:p>
             <a:pPr lvl="4"/>
@@ -775,7 +765,6 @@
           <a:p>
             <a:fld id="{126F170E-E814-4B3B-A85B-D0CEE3E81FCB}" type="datetimeFigureOut">
               <a:rPr lang="es-MX" smtClean="0"/>
-              <a:t>15/01/2020</a:t>
             </a:fld>
             <a:endParaRPr lang="es-MX"/>
           </a:p>
@@ -817,18 +806,12 @@
           <a:p>
             <a:fld id="{7964CD6F-4211-4BE0-AF92-843C51BD8986}" type="slidenum">
               <a:rPr lang="es-MX" smtClean="0"/>
-              <a:t>‹Nº›</a:t>
             </a:fld>
             <a:endParaRPr lang="es-MX"/>
           </a:p>
         </p:txBody>
       </p:sp>
     </p:spTree>
-    <p:extLst>
-      <p:ext uri="{BB962C8B-B14F-4D97-AF65-F5344CB8AC3E}">
-        <p14:creationId xmlns:p14="http://schemas.microsoft.com/office/powerpoint/2010/main" val="1115893927"/>
-      </p:ext>
-    </p:extLst>
   </p:cSld>
   <p:clrMapOvr>
     <a:masterClrMapping/>
@@ -892,7 +875,7 @@
             <a:spLocks noGrp="1"/>
           </p:cNvSpPr>
           <p:nvPr>
-            <p:ph type="body" idx="1"/>
+            <p:ph type="body" idx="1" hasCustomPrompt="1"/>
           </p:nvPr>
         </p:nvSpPr>
         <p:spPr>
@@ -1001,6 +984,7 @@
               <a:rPr lang="es-ES" smtClean="0"/>
               <a:t>Haga clic para modificar el estilo de texto del patrón</a:t>
             </a:r>
+            <a:endParaRPr lang="es-ES" smtClean="0"/>
           </a:p>
         </p:txBody>
       </p:sp>
@@ -1021,7 +1005,6 @@
           <a:p>
             <a:fld id="{126F170E-E814-4B3B-A85B-D0CEE3E81FCB}" type="datetimeFigureOut">
               <a:rPr lang="es-MX" smtClean="0"/>
-              <a:t>15/01/2020</a:t>
             </a:fld>
             <a:endParaRPr lang="es-MX"/>
           </a:p>
@@ -1063,18 +1046,12 @@
           <a:p>
             <a:fld id="{7964CD6F-4211-4BE0-AF92-843C51BD8986}" type="slidenum">
               <a:rPr lang="es-MX" smtClean="0"/>
-              <a:t>‹Nº›</a:t>
             </a:fld>
             <a:endParaRPr lang="es-MX"/>
           </a:p>
         </p:txBody>
       </p:sp>
     </p:spTree>
-    <p:extLst>
-      <p:ext uri="{BB962C8B-B14F-4D97-AF65-F5344CB8AC3E}">
-        <p14:creationId xmlns:p14="http://schemas.microsoft.com/office/powerpoint/2010/main" val="1354417097"/>
-      </p:ext>
-    </p:extLst>
   </p:cSld>
   <p:clrMapOvr>
     <a:masterClrMapping/>
@@ -1129,7 +1106,7 @@
             <a:spLocks noGrp="1"/>
           </p:cNvSpPr>
           <p:nvPr>
-            <p:ph sz="half" idx="1"/>
+            <p:ph sz="half" idx="1" hasCustomPrompt="1"/>
           </p:nvPr>
         </p:nvSpPr>
         <p:spPr>
@@ -1147,6 +1124,7 @@
               <a:rPr lang="es-ES" smtClean="0"/>
               <a:t>Haga clic para modificar el estilo de texto del patrón</a:t>
             </a:r>
+            <a:endParaRPr lang="es-ES" smtClean="0"/>
           </a:p>
           <a:p>
             <a:pPr lvl="1"/>
@@ -1154,6 +1132,7 @@
               <a:rPr lang="es-ES" smtClean="0"/>
               <a:t>Segundo nivel</a:t>
             </a:r>
+            <a:endParaRPr lang="es-ES" smtClean="0"/>
           </a:p>
           <a:p>
             <a:pPr lvl="2"/>
@@ -1161,6 +1140,7 @@
               <a:rPr lang="es-ES" smtClean="0"/>
               <a:t>Tercer nivel</a:t>
             </a:r>
+            <a:endParaRPr lang="es-ES" smtClean="0"/>
           </a:p>
           <a:p>
             <a:pPr lvl="3"/>
@@ -1168,6 +1148,7 @@
               <a:rPr lang="es-ES" smtClean="0"/>
               <a:t>Cuarto nivel</a:t>
             </a:r>
+            <a:endParaRPr lang="es-ES" smtClean="0"/>
           </a:p>
           <a:p>
             <a:pPr lvl="4"/>
@@ -1186,7 +1167,7 @@
             <a:spLocks noGrp="1"/>
           </p:cNvSpPr>
           <p:nvPr>
-            <p:ph sz="half" idx="2"/>
+            <p:ph sz="half" idx="2" hasCustomPrompt="1"/>
           </p:nvPr>
         </p:nvSpPr>
         <p:spPr>
@@ -1204,6 +1185,7 @@
               <a:rPr lang="es-ES" smtClean="0"/>
               <a:t>Haga clic para modificar el estilo de texto del patrón</a:t>
             </a:r>
+            <a:endParaRPr lang="es-ES" smtClean="0"/>
           </a:p>
           <a:p>
             <a:pPr lvl="1"/>
@@ -1211,6 +1193,7 @@
               <a:rPr lang="es-ES" smtClean="0"/>
               <a:t>Segundo nivel</a:t>
             </a:r>
+            <a:endParaRPr lang="es-ES" smtClean="0"/>
           </a:p>
           <a:p>
             <a:pPr lvl="2"/>
@@ -1218,6 +1201,7 @@
               <a:rPr lang="es-ES" smtClean="0"/>
               <a:t>Tercer nivel</a:t>
             </a:r>
+            <a:endParaRPr lang="es-ES" smtClean="0"/>
           </a:p>
           <a:p>
             <a:pPr lvl="3"/>
@@ -1225,6 +1209,7 @@
               <a:rPr lang="es-ES" smtClean="0"/>
               <a:t>Cuarto nivel</a:t>
             </a:r>
+            <a:endParaRPr lang="es-ES" smtClean="0"/>
           </a:p>
           <a:p>
             <a:pPr lvl="4"/>
@@ -1253,7 +1238,6 @@
           <a:p>
             <a:fld id="{126F170E-E814-4B3B-A85B-D0CEE3E81FCB}" type="datetimeFigureOut">
               <a:rPr lang="es-MX" smtClean="0"/>
-              <a:t>15/01/2020</a:t>
             </a:fld>
             <a:endParaRPr lang="es-MX"/>
           </a:p>
@@ -1295,18 +1279,12 @@
           <a:p>
             <a:fld id="{7964CD6F-4211-4BE0-AF92-843C51BD8986}" type="slidenum">
               <a:rPr lang="es-MX" smtClean="0"/>
-              <a:t>‹Nº›</a:t>
             </a:fld>
             <a:endParaRPr lang="es-MX"/>
           </a:p>
         </p:txBody>
       </p:sp>
     </p:spTree>
-    <p:extLst>
-      <p:ext uri="{BB962C8B-B14F-4D97-AF65-F5344CB8AC3E}">
-        <p14:creationId xmlns:p14="http://schemas.microsoft.com/office/powerpoint/2010/main" val="1383476552"/>
-      </p:ext>
-    </p:extLst>
   </p:cSld>
   <p:clrMapOvr>
     <a:masterClrMapping/>
@@ -1366,7 +1344,7 @@
             <a:spLocks noGrp="1"/>
           </p:cNvSpPr>
           <p:nvPr>
-            <p:ph type="body" idx="1"/>
+            <p:ph type="body" idx="1" hasCustomPrompt="1"/>
           </p:nvPr>
         </p:nvSpPr>
         <p:spPr>
@@ -1421,6 +1399,7 @@
               <a:rPr lang="es-ES" smtClean="0"/>
               <a:t>Haga clic para modificar el estilo de texto del patrón</a:t>
             </a:r>
+            <a:endParaRPr lang="es-ES" smtClean="0"/>
           </a:p>
         </p:txBody>
       </p:sp>
@@ -1431,7 +1410,7 @@
             <a:spLocks noGrp="1"/>
           </p:cNvSpPr>
           <p:nvPr>
-            <p:ph sz="half" idx="2"/>
+            <p:ph sz="half" idx="2" hasCustomPrompt="1"/>
           </p:nvPr>
         </p:nvSpPr>
         <p:spPr>
@@ -1449,6 +1428,7 @@
               <a:rPr lang="es-ES" smtClean="0"/>
               <a:t>Haga clic para modificar el estilo de texto del patrón</a:t>
             </a:r>
+            <a:endParaRPr lang="es-ES" smtClean="0"/>
           </a:p>
           <a:p>
             <a:pPr lvl="1"/>
@@ -1456,6 +1436,7 @@
               <a:rPr lang="es-ES" smtClean="0"/>
               <a:t>Segundo nivel</a:t>
             </a:r>
+            <a:endParaRPr lang="es-ES" smtClean="0"/>
           </a:p>
           <a:p>
             <a:pPr lvl="2"/>
@@ -1463,6 +1444,7 @@
               <a:rPr lang="es-ES" smtClean="0"/>
               <a:t>Tercer nivel</a:t>
             </a:r>
+            <a:endParaRPr lang="es-ES" smtClean="0"/>
           </a:p>
           <a:p>
             <a:pPr lvl="3"/>
@@ -1470,6 +1452,7 @@
               <a:rPr lang="es-ES" smtClean="0"/>
               <a:t>Cuarto nivel</a:t>
             </a:r>
+            <a:endParaRPr lang="es-ES" smtClean="0"/>
           </a:p>
           <a:p>
             <a:pPr lvl="4"/>
@@ -1488,7 +1471,7 @@
             <a:spLocks noGrp="1"/>
           </p:cNvSpPr>
           <p:nvPr>
-            <p:ph type="body" sz="quarter" idx="3"/>
+            <p:ph type="body" sz="quarter" idx="3" hasCustomPrompt="1"/>
           </p:nvPr>
         </p:nvSpPr>
         <p:spPr>
@@ -1543,6 +1526,7 @@
               <a:rPr lang="es-ES" smtClean="0"/>
               <a:t>Haga clic para modificar el estilo de texto del patrón</a:t>
             </a:r>
+            <a:endParaRPr lang="es-ES" smtClean="0"/>
           </a:p>
         </p:txBody>
       </p:sp>
@@ -1553,7 +1537,7 @@
             <a:spLocks noGrp="1"/>
           </p:cNvSpPr>
           <p:nvPr>
-            <p:ph sz="quarter" idx="4"/>
+            <p:ph sz="quarter" idx="4" hasCustomPrompt="1"/>
           </p:nvPr>
         </p:nvSpPr>
         <p:spPr>
@@ -1571,6 +1555,7 @@
               <a:rPr lang="es-ES" smtClean="0"/>
               <a:t>Haga clic para modificar el estilo de texto del patrón</a:t>
             </a:r>
+            <a:endParaRPr lang="es-ES" smtClean="0"/>
           </a:p>
           <a:p>
             <a:pPr lvl="1"/>
@@ -1578,6 +1563,7 @@
               <a:rPr lang="es-ES" smtClean="0"/>
               <a:t>Segundo nivel</a:t>
             </a:r>
+            <a:endParaRPr lang="es-ES" smtClean="0"/>
           </a:p>
           <a:p>
             <a:pPr lvl="2"/>
@@ -1585,6 +1571,7 @@
               <a:rPr lang="es-ES" smtClean="0"/>
               <a:t>Tercer nivel</a:t>
             </a:r>
+            <a:endParaRPr lang="es-ES" smtClean="0"/>
           </a:p>
           <a:p>
             <a:pPr lvl="3"/>
@@ -1592,6 +1579,7 @@
               <a:rPr lang="es-ES" smtClean="0"/>
               <a:t>Cuarto nivel</a:t>
             </a:r>
+            <a:endParaRPr lang="es-ES" smtClean="0"/>
           </a:p>
           <a:p>
             <a:pPr lvl="4"/>
@@ -1620,7 +1608,6 @@
           <a:p>
             <a:fld id="{126F170E-E814-4B3B-A85B-D0CEE3E81FCB}" type="datetimeFigureOut">
               <a:rPr lang="es-MX" smtClean="0"/>
-              <a:t>15/01/2020</a:t>
             </a:fld>
             <a:endParaRPr lang="es-MX"/>
           </a:p>
@@ -1662,18 +1649,12 @@
           <a:p>
             <a:fld id="{7964CD6F-4211-4BE0-AF92-843C51BD8986}" type="slidenum">
               <a:rPr lang="es-MX" smtClean="0"/>
-              <a:t>‹Nº›</a:t>
             </a:fld>
             <a:endParaRPr lang="es-MX"/>
           </a:p>
         </p:txBody>
       </p:sp>
     </p:spTree>
-    <p:extLst>
-      <p:ext uri="{BB962C8B-B14F-4D97-AF65-F5344CB8AC3E}">
-        <p14:creationId xmlns:p14="http://schemas.microsoft.com/office/powerpoint/2010/main" val="526676064"/>
-      </p:ext>
-    </p:extLst>
   </p:cSld>
   <p:clrMapOvr>
     <a:masterClrMapping/>
@@ -1738,7 +1719,6 @@
           <a:p>
             <a:fld id="{126F170E-E814-4B3B-A85B-D0CEE3E81FCB}" type="datetimeFigureOut">
               <a:rPr lang="es-MX" smtClean="0"/>
-              <a:t>15/01/2020</a:t>
             </a:fld>
             <a:endParaRPr lang="es-MX"/>
           </a:p>
@@ -1780,18 +1760,12 @@
           <a:p>
             <a:fld id="{7964CD6F-4211-4BE0-AF92-843C51BD8986}" type="slidenum">
               <a:rPr lang="es-MX" smtClean="0"/>
-              <a:t>‹Nº›</a:t>
             </a:fld>
             <a:endParaRPr lang="es-MX"/>
           </a:p>
         </p:txBody>
       </p:sp>
     </p:spTree>
-    <p:extLst>
-      <p:ext uri="{BB962C8B-B14F-4D97-AF65-F5344CB8AC3E}">
-        <p14:creationId xmlns:p14="http://schemas.microsoft.com/office/powerpoint/2010/main" val="3015292962"/>
-      </p:ext>
-    </p:extLst>
   </p:cSld>
   <p:clrMapOvr>
     <a:masterClrMapping/>
@@ -1833,7 +1807,6 @@
           <a:p>
             <a:fld id="{126F170E-E814-4B3B-A85B-D0CEE3E81FCB}" type="datetimeFigureOut">
               <a:rPr lang="es-MX" smtClean="0"/>
-              <a:t>15/01/2020</a:t>
             </a:fld>
             <a:endParaRPr lang="es-MX"/>
           </a:p>
@@ -1875,18 +1848,12 @@
           <a:p>
             <a:fld id="{7964CD6F-4211-4BE0-AF92-843C51BD8986}" type="slidenum">
               <a:rPr lang="es-MX" smtClean="0"/>
-              <a:t>‹Nº›</a:t>
             </a:fld>
             <a:endParaRPr lang="es-MX"/>
           </a:p>
         </p:txBody>
       </p:sp>
     </p:spTree>
-    <p:extLst>
-      <p:ext uri="{BB962C8B-B14F-4D97-AF65-F5344CB8AC3E}">
-        <p14:creationId xmlns:p14="http://schemas.microsoft.com/office/powerpoint/2010/main" val="1611762734"/>
-      </p:ext>
-    </p:extLst>
   </p:cSld>
   <p:clrMapOvr>
     <a:masterClrMapping/>
@@ -1950,7 +1917,7 @@
             <a:spLocks noGrp="1"/>
           </p:cNvSpPr>
           <p:nvPr>
-            <p:ph idx="1"/>
+            <p:ph idx="1" hasCustomPrompt="1"/>
           </p:nvPr>
         </p:nvSpPr>
         <p:spPr>
@@ -1996,6 +1963,7 @@
               <a:rPr lang="es-ES" smtClean="0"/>
               <a:t>Haga clic para modificar el estilo de texto del patrón</a:t>
             </a:r>
+            <a:endParaRPr lang="es-ES" smtClean="0"/>
           </a:p>
           <a:p>
             <a:pPr lvl="1"/>
@@ -2003,6 +1971,7 @@
               <a:rPr lang="es-ES" smtClean="0"/>
               <a:t>Segundo nivel</a:t>
             </a:r>
+            <a:endParaRPr lang="es-ES" smtClean="0"/>
           </a:p>
           <a:p>
             <a:pPr lvl="2"/>
@@ -2010,6 +1979,7 @@
               <a:rPr lang="es-ES" smtClean="0"/>
               <a:t>Tercer nivel</a:t>
             </a:r>
+            <a:endParaRPr lang="es-ES" smtClean="0"/>
           </a:p>
           <a:p>
             <a:pPr lvl="3"/>
@@ -2017,6 +1987,7 @@
               <a:rPr lang="es-ES" smtClean="0"/>
               <a:t>Cuarto nivel</a:t>
             </a:r>
+            <a:endParaRPr lang="es-ES" smtClean="0"/>
           </a:p>
           <a:p>
             <a:pPr lvl="4"/>
@@ -2035,7 +2006,7 @@
             <a:spLocks noGrp="1"/>
           </p:cNvSpPr>
           <p:nvPr>
-            <p:ph type="body" sz="half" idx="2"/>
+            <p:ph type="body" sz="half" idx="2" hasCustomPrompt="1"/>
           </p:nvPr>
         </p:nvSpPr>
         <p:spPr>
@@ -2090,6 +2061,7 @@
               <a:rPr lang="es-ES" smtClean="0"/>
               <a:t>Haga clic para modificar el estilo de texto del patrón</a:t>
             </a:r>
+            <a:endParaRPr lang="es-ES" smtClean="0"/>
           </a:p>
         </p:txBody>
       </p:sp>
@@ -2110,7 +2082,6 @@
           <a:p>
             <a:fld id="{126F170E-E814-4B3B-A85B-D0CEE3E81FCB}" type="datetimeFigureOut">
               <a:rPr lang="es-MX" smtClean="0"/>
-              <a:t>15/01/2020</a:t>
             </a:fld>
             <a:endParaRPr lang="es-MX"/>
           </a:p>
@@ -2152,18 +2123,12 @@
           <a:p>
             <a:fld id="{7964CD6F-4211-4BE0-AF92-843C51BD8986}" type="slidenum">
               <a:rPr lang="es-MX" smtClean="0"/>
-              <a:t>‹Nº›</a:t>
             </a:fld>
             <a:endParaRPr lang="es-MX"/>
           </a:p>
         </p:txBody>
       </p:sp>
     </p:spTree>
-    <p:extLst>
-      <p:ext uri="{BB962C8B-B14F-4D97-AF65-F5344CB8AC3E}">
-        <p14:creationId xmlns:p14="http://schemas.microsoft.com/office/powerpoint/2010/main" val="3362756363"/>
-      </p:ext>
-    </p:extLst>
   </p:cSld>
   <p:clrMapOvr>
     <a:masterClrMapping/>
@@ -2288,7 +2253,7 @@
             <a:spLocks noGrp="1"/>
           </p:cNvSpPr>
           <p:nvPr>
-            <p:ph type="body" sz="half" idx="2"/>
+            <p:ph type="body" sz="half" idx="2" hasCustomPrompt="1"/>
           </p:nvPr>
         </p:nvSpPr>
         <p:spPr>
@@ -2343,6 +2308,7 @@
               <a:rPr lang="es-ES" smtClean="0"/>
               <a:t>Haga clic para modificar el estilo de texto del patrón</a:t>
             </a:r>
+            <a:endParaRPr lang="es-ES" smtClean="0"/>
           </a:p>
         </p:txBody>
       </p:sp>
@@ -2363,7 +2329,6 @@
           <a:p>
             <a:fld id="{126F170E-E814-4B3B-A85B-D0CEE3E81FCB}" type="datetimeFigureOut">
               <a:rPr lang="es-MX" smtClean="0"/>
-              <a:t>15/01/2020</a:t>
             </a:fld>
             <a:endParaRPr lang="es-MX"/>
           </a:p>
@@ -2405,18 +2370,12 @@
           <a:p>
             <a:fld id="{7964CD6F-4211-4BE0-AF92-843C51BD8986}" type="slidenum">
               <a:rPr lang="es-MX" smtClean="0"/>
-              <a:t>‹Nº›</a:t>
             </a:fld>
             <a:endParaRPr lang="es-MX"/>
           </a:p>
         </p:txBody>
       </p:sp>
     </p:spTree>
-    <p:extLst>
-      <p:ext uri="{BB962C8B-B14F-4D97-AF65-F5344CB8AC3E}">
-        <p14:creationId xmlns:p14="http://schemas.microsoft.com/office/powerpoint/2010/main" val="3450727863"/>
-      </p:ext>
-    </p:extLst>
   </p:cSld>
   <p:clrMapOvr>
     <a:masterClrMapping/>
@@ -2509,6 +2468,7 @@
               <a:rPr lang="es-ES" smtClean="0"/>
               <a:t>Haga clic para modificar el estilo de texto del patrón</a:t>
             </a:r>
+            <a:endParaRPr lang="es-ES" smtClean="0"/>
           </a:p>
           <a:p>
             <a:pPr lvl="1"/>
@@ -2516,6 +2476,7 @@
               <a:rPr lang="es-ES" smtClean="0"/>
               <a:t>Segundo nivel</a:t>
             </a:r>
+            <a:endParaRPr lang="es-ES" smtClean="0"/>
           </a:p>
           <a:p>
             <a:pPr lvl="2"/>
@@ -2523,6 +2484,7 @@
               <a:rPr lang="es-ES" smtClean="0"/>
               <a:t>Tercer nivel</a:t>
             </a:r>
+            <a:endParaRPr lang="es-ES" smtClean="0"/>
           </a:p>
           <a:p>
             <a:pPr lvl="3"/>
@@ -2530,6 +2492,7 @@
               <a:rPr lang="es-ES" smtClean="0"/>
               <a:t>Cuarto nivel</a:t>
             </a:r>
+            <a:endParaRPr lang="es-ES" smtClean="0"/>
           </a:p>
           <a:p>
             <a:pPr lvl="4"/>
@@ -2576,7 +2539,6 @@
           <a:p>
             <a:fld id="{126F170E-E814-4B3B-A85B-D0CEE3E81FCB}" type="datetimeFigureOut">
               <a:rPr lang="es-MX" smtClean="0"/>
-              <a:t>15/01/2020</a:t>
             </a:fld>
             <a:endParaRPr lang="es-MX"/>
           </a:p>
@@ -2654,18 +2616,12 @@
           <a:p>
             <a:fld id="{7964CD6F-4211-4BE0-AF92-843C51BD8986}" type="slidenum">
               <a:rPr lang="es-MX" smtClean="0"/>
-              <a:t>‹Nº›</a:t>
             </a:fld>
             <a:endParaRPr lang="es-MX"/>
           </a:p>
         </p:txBody>
       </p:sp>
     </p:spTree>
-    <p:extLst>
-      <p:ext uri="{BB962C8B-B14F-4D97-AF65-F5344CB8AC3E}">
-        <p14:creationId xmlns:p14="http://schemas.microsoft.com/office/powerpoint/2010/main" val="402669767"/>
-      </p:ext>
-    </p:extLst>
   </p:cSld>
   <p:clrMap bg1="lt1" tx1="dk1" bg2="lt2" tx2="dk2" accent1="accent1" accent2="accent2" accent3="accent3" accent4="accent4" accent5="accent5" accent6="accent6" hlink="hlink" folHlink="folHlink"/>
   <p:sldLayoutIdLst>
@@ -3028,7 +2984,7 @@
           <p:nvPr/>
         </p:nvPicPr>
         <p:blipFill>
-          <a:blip r:embed="rId2">
+          <a:blip r:embed="rId1">
             <a:extLst>
               <a:ext uri="{28A0092B-C50C-407E-A947-70E740481C1C}">
                 <a14:useLocalDpi xmlns:a14="http://schemas.microsoft.com/office/drawing/2010/main" val="0"/>
@@ -3052,6 +3008,47 @@
       <p:pic>
         <p:nvPicPr>
           <p:cNvPr id="1026" name="Picture 2" descr="Resultado de imagen para linux full hd logo&quot;"/>
+          <p:cNvPicPr>
+            <a:picLocks noChangeAspect="1" noChangeArrowheads="1"/>
+          </p:cNvPicPr>
+          <p:nvPr/>
+        </p:nvPicPr>
+        <p:blipFill>
+          <a:blip r:embed="rId2" cstate="print">
+            <a:extLst>
+              <a:ext uri="{28A0092B-C50C-407E-A947-70E740481C1C}">
+                <a14:useLocalDpi xmlns:a14="http://schemas.microsoft.com/office/drawing/2010/main" val="0"/>
+              </a:ext>
+            </a:extLst>
+          </a:blip>
+          <a:srcRect/>
+          <a:stretch>
+            <a:fillRect/>
+          </a:stretch>
+        </p:blipFill>
+        <p:spPr bwMode="auto">
+          <a:xfrm>
+            <a:off x="5778372" y="695173"/>
+            <a:ext cx="622042" cy="746450"/>
+          </a:xfrm>
+          <a:prstGeom prst="rect">
+            <a:avLst/>
+          </a:prstGeom>
+          <a:noFill/>
+          <a:extLst>
+            <a:ext uri="{909E8E84-426E-40DD-AFC4-6F175D3DCCD1}">
+              <a14:hiddenFill xmlns:a14="http://schemas.microsoft.com/office/drawing/2010/main">
+                <a:solidFill>
+                  <a:srgbClr val="FFFFFF"/>
+                </a:solidFill>
+              </a14:hiddenFill>
+            </a:ext>
+          </a:extLst>
+        </p:spPr>
+      </p:pic>
+      <p:pic>
+        <p:nvPicPr>
+          <p:cNvPr id="1030" name="Picture 6" descr="Resultado de imagen para windows logo hd&quot;"/>
           <p:cNvPicPr>
             <a:picLocks noChangeAspect="1" noChangeArrowheads="1"/>
           </p:cNvPicPr>
@@ -3072,8 +3069,8 @@
         </p:blipFill>
         <p:spPr bwMode="auto">
           <a:xfrm>
-            <a:off x="5778372" y="695173"/>
-            <a:ext cx="622042" cy="746450"/>
+            <a:off x="4080047" y="271753"/>
+            <a:ext cx="1609146" cy="1609146"/>
           </a:xfrm>
           <a:prstGeom prst="rect">
             <a:avLst/>
@@ -3092,7 +3089,7 @@
       </p:pic>
       <p:pic>
         <p:nvPicPr>
-          <p:cNvPr id="1030" name="Picture 6" descr="Resultado de imagen para windows logo hd&quot;"/>
+          <p:cNvPr id="1032" name="Picture 8" descr="Resultado de imagen para mac os catalina logo&quot;"/>
           <p:cNvPicPr>
             <a:picLocks noChangeAspect="1" noChangeArrowheads="1"/>
           </p:cNvPicPr>
@@ -3113,47 +3110,6 @@
         </p:blipFill>
         <p:spPr bwMode="auto">
           <a:xfrm>
-            <a:off x="4080047" y="271753"/>
-            <a:ext cx="1609146" cy="1609146"/>
-          </a:xfrm>
-          <a:prstGeom prst="rect">
-            <a:avLst/>
-          </a:prstGeom>
-          <a:noFill/>
-          <a:extLst>
-            <a:ext uri="{909E8E84-426E-40DD-AFC4-6F175D3DCCD1}">
-              <a14:hiddenFill xmlns:a14="http://schemas.microsoft.com/office/drawing/2010/main">
-                <a:solidFill>
-                  <a:srgbClr val="FFFFFF"/>
-                </a:solidFill>
-              </a14:hiddenFill>
-            </a:ext>
-          </a:extLst>
-        </p:spPr>
-      </p:pic>
-      <p:pic>
-        <p:nvPicPr>
-          <p:cNvPr id="1032" name="Picture 8" descr="Resultado de imagen para mac os catalina logo&quot;"/>
-          <p:cNvPicPr>
-            <a:picLocks noChangeAspect="1" noChangeArrowheads="1"/>
-          </p:cNvPicPr>
-          <p:nvPr/>
-        </p:nvPicPr>
-        <p:blipFill>
-          <a:blip r:embed="rId5" cstate="print">
-            <a:extLst>
-              <a:ext uri="{28A0092B-C50C-407E-A947-70E740481C1C}">
-                <a14:useLocalDpi xmlns:a14="http://schemas.microsoft.com/office/drawing/2010/main" val="0"/>
-              </a:ext>
-            </a:extLst>
-          </a:blip>
-          <a:srcRect/>
-          <a:stretch>
-            <a:fillRect/>
-          </a:stretch>
-        </p:blipFill>
-        <p:spPr bwMode="auto">
-          <a:xfrm>
             <a:off x="6817873" y="695173"/>
             <a:ext cx="803853" cy="803853"/>
           </a:xfrm>
@@ -3287,11 +3243,6 @@
         </p:txBody>
       </p:sp>
     </p:spTree>
-    <p:extLst>
-      <p:ext uri="{BB962C8B-B14F-4D97-AF65-F5344CB8AC3E}">
-        <p14:creationId xmlns:p14="http://schemas.microsoft.com/office/powerpoint/2010/main" val="1909815540"/>
-      </p:ext>
-    </p:extLst>
   </p:cSld>
   <p:clrMapOvr>
     <a:masterClrMapping/>
@@ -3363,7 +3314,7 @@
           <p:nvPr/>
         </p:nvPicPr>
         <p:blipFill>
-          <a:blip r:embed="rId2">
+          <a:blip r:embed="rId1">
             <a:extLst>
               <a:ext uri="{28A0092B-C50C-407E-A947-70E740481C1C}">
                 <a14:useLocalDpi xmlns:a14="http://schemas.microsoft.com/office/drawing/2010/main" val="0"/>
@@ -3387,6 +3338,47 @@
       <p:pic>
         <p:nvPicPr>
           <p:cNvPr id="1026" name="Picture 2" descr="Resultado de imagen para linux full hd logo&quot;"/>
+          <p:cNvPicPr>
+            <a:picLocks noChangeAspect="1" noChangeArrowheads="1"/>
+          </p:cNvPicPr>
+          <p:nvPr/>
+        </p:nvPicPr>
+        <p:blipFill>
+          <a:blip r:embed="rId2" cstate="print">
+            <a:extLst>
+              <a:ext uri="{28A0092B-C50C-407E-A947-70E740481C1C}">
+                <a14:useLocalDpi xmlns:a14="http://schemas.microsoft.com/office/drawing/2010/main" val="0"/>
+              </a:ext>
+            </a:extLst>
+          </a:blip>
+          <a:srcRect/>
+          <a:stretch>
+            <a:fillRect/>
+          </a:stretch>
+        </p:blipFill>
+        <p:spPr bwMode="auto">
+          <a:xfrm>
+            <a:off x="5778372" y="695173"/>
+            <a:ext cx="622042" cy="746450"/>
+          </a:xfrm>
+          <a:prstGeom prst="rect">
+            <a:avLst/>
+          </a:prstGeom>
+          <a:noFill/>
+          <a:extLst>
+            <a:ext uri="{909E8E84-426E-40DD-AFC4-6F175D3DCCD1}">
+              <a14:hiddenFill xmlns:a14="http://schemas.microsoft.com/office/drawing/2010/main">
+                <a:solidFill>
+                  <a:srgbClr val="FFFFFF"/>
+                </a:solidFill>
+              </a14:hiddenFill>
+            </a:ext>
+          </a:extLst>
+        </p:spPr>
+      </p:pic>
+      <p:pic>
+        <p:nvPicPr>
+          <p:cNvPr id="1030" name="Picture 6" descr="Resultado de imagen para windows logo hd&quot;"/>
           <p:cNvPicPr>
             <a:picLocks noChangeAspect="1" noChangeArrowheads="1"/>
           </p:cNvPicPr>
@@ -3407,8 +3399,8 @@
         </p:blipFill>
         <p:spPr bwMode="auto">
           <a:xfrm>
-            <a:off x="5778372" y="695173"/>
-            <a:ext cx="622042" cy="746450"/>
+            <a:off x="4080047" y="271753"/>
+            <a:ext cx="1609146" cy="1609146"/>
           </a:xfrm>
           <a:prstGeom prst="rect">
             <a:avLst/>
@@ -3427,7 +3419,7 @@
       </p:pic>
       <p:pic>
         <p:nvPicPr>
-          <p:cNvPr id="1030" name="Picture 6" descr="Resultado de imagen para windows logo hd&quot;"/>
+          <p:cNvPr id="1032" name="Picture 8" descr="Resultado de imagen para mac os catalina logo&quot;"/>
           <p:cNvPicPr>
             <a:picLocks noChangeAspect="1" noChangeArrowheads="1"/>
           </p:cNvPicPr>
@@ -3448,47 +3440,6 @@
         </p:blipFill>
         <p:spPr bwMode="auto">
           <a:xfrm>
-            <a:off x="4080047" y="271753"/>
-            <a:ext cx="1609146" cy="1609146"/>
-          </a:xfrm>
-          <a:prstGeom prst="rect">
-            <a:avLst/>
-          </a:prstGeom>
-          <a:noFill/>
-          <a:extLst>
-            <a:ext uri="{909E8E84-426E-40DD-AFC4-6F175D3DCCD1}">
-              <a14:hiddenFill xmlns:a14="http://schemas.microsoft.com/office/drawing/2010/main">
-                <a:solidFill>
-                  <a:srgbClr val="FFFFFF"/>
-                </a:solidFill>
-              </a14:hiddenFill>
-            </a:ext>
-          </a:extLst>
-        </p:spPr>
-      </p:pic>
-      <p:pic>
-        <p:nvPicPr>
-          <p:cNvPr id="1032" name="Picture 8" descr="Resultado de imagen para mac os catalina logo&quot;"/>
-          <p:cNvPicPr>
-            <a:picLocks noChangeAspect="1" noChangeArrowheads="1"/>
-          </p:cNvPicPr>
-          <p:nvPr/>
-        </p:nvPicPr>
-        <p:blipFill>
-          <a:blip r:embed="rId5" cstate="print">
-            <a:extLst>
-              <a:ext uri="{28A0092B-C50C-407E-A947-70E740481C1C}">
-                <a14:useLocalDpi xmlns:a14="http://schemas.microsoft.com/office/drawing/2010/main" val="0"/>
-              </a:ext>
-            </a:extLst>
-          </a:blip>
-          <a:srcRect/>
-          <a:stretch>
-            <a:fillRect/>
-          </a:stretch>
-        </p:blipFill>
-        <p:spPr bwMode="auto">
-          <a:xfrm>
             <a:off x="6817873" y="695173"/>
             <a:ext cx="803853" cy="803853"/>
           </a:xfrm>
@@ -3592,7 +3543,7 @@
           <p:nvPr/>
         </p:nvPicPr>
         <p:blipFill>
-          <a:blip r:embed="rId6"/>
+          <a:blip r:embed="rId5"/>
           <a:stretch>
             <a:fillRect/>
           </a:stretch>
@@ -3608,11 +3559,6 @@
         </p:spPr>
       </p:pic>
     </p:spTree>
-    <p:extLst>
-      <p:ext uri="{BB962C8B-B14F-4D97-AF65-F5344CB8AC3E}">
-        <p14:creationId xmlns:p14="http://schemas.microsoft.com/office/powerpoint/2010/main" val="113185729"/>
-      </p:ext>
-    </p:extLst>
   </p:cSld>
   <p:clrMapOvr>
     <a:masterClrMapping/>
@@ -3684,7 +3630,7 @@
           <p:nvPr/>
         </p:nvPicPr>
         <p:blipFill>
-          <a:blip r:embed="rId2">
+          <a:blip r:embed="rId1">
             <a:extLst>
               <a:ext uri="{28A0092B-C50C-407E-A947-70E740481C1C}">
                 <a14:useLocalDpi xmlns:a14="http://schemas.microsoft.com/office/drawing/2010/main" val="0"/>
@@ -3708,6 +3654,47 @@
       <p:pic>
         <p:nvPicPr>
           <p:cNvPr id="1026" name="Picture 2" descr="Resultado de imagen para linux full hd logo&quot;"/>
+          <p:cNvPicPr>
+            <a:picLocks noChangeAspect="1" noChangeArrowheads="1"/>
+          </p:cNvPicPr>
+          <p:nvPr/>
+        </p:nvPicPr>
+        <p:blipFill>
+          <a:blip r:embed="rId2" cstate="print">
+            <a:extLst>
+              <a:ext uri="{28A0092B-C50C-407E-A947-70E740481C1C}">
+                <a14:useLocalDpi xmlns:a14="http://schemas.microsoft.com/office/drawing/2010/main" val="0"/>
+              </a:ext>
+            </a:extLst>
+          </a:blip>
+          <a:srcRect/>
+          <a:stretch>
+            <a:fillRect/>
+          </a:stretch>
+        </p:blipFill>
+        <p:spPr bwMode="auto">
+          <a:xfrm>
+            <a:off x="5778372" y="695173"/>
+            <a:ext cx="622042" cy="746450"/>
+          </a:xfrm>
+          <a:prstGeom prst="rect">
+            <a:avLst/>
+          </a:prstGeom>
+          <a:noFill/>
+          <a:extLst>
+            <a:ext uri="{909E8E84-426E-40DD-AFC4-6F175D3DCCD1}">
+              <a14:hiddenFill xmlns:a14="http://schemas.microsoft.com/office/drawing/2010/main">
+                <a:solidFill>
+                  <a:srgbClr val="FFFFFF"/>
+                </a:solidFill>
+              </a14:hiddenFill>
+            </a:ext>
+          </a:extLst>
+        </p:spPr>
+      </p:pic>
+      <p:pic>
+        <p:nvPicPr>
+          <p:cNvPr id="1030" name="Picture 6" descr="Resultado de imagen para windows logo hd&quot;"/>
           <p:cNvPicPr>
             <a:picLocks noChangeAspect="1" noChangeArrowheads="1"/>
           </p:cNvPicPr>
@@ -3728,8 +3715,8 @@
         </p:blipFill>
         <p:spPr bwMode="auto">
           <a:xfrm>
-            <a:off x="5778372" y="695173"/>
-            <a:ext cx="622042" cy="746450"/>
+            <a:off x="4080047" y="271753"/>
+            <a:ext cx="1609146" cy="1609146"/>
           </a:xfrm>
           <a:prstGeom prst="rect">
             <a:avLst/>
@@ -3748,7 +3735,7 @@
       </p:pic>
       <p:pic>
         <p:nvPicPr>
-          <p:cNvPr id="1030" name="Picture 6" descr="Resultado de imagen para windows logo hd&quot;"/>
+          <p:cNvPr id="1032" name="Picture 8" descr="Resultado de imagen para mac os catalina logo&quot;"/>
           <p:cNvPicPr>
             <a:picLocks noChangeAspect="1" noChangeArrowheads="1"/>
           </p:cNvPicPr>
@@ -3769,47 +3756,6 @@
         </p:blipFill>
         <p:spPr bwMode="auto">
           <a:xfrm>
-            <a:off x="4080047" y="271753"/>
-            <a:ext cx="1609146" cy="1609146"/>
-          </a:xfrm>
-          <a:prstGeom prst="rect">
-            <a:avLst/>
-          </a:prstGeom>
-          <a:noFill/>
-          <a:extLst>
-            <a:ext uri="{909E8E84-426E-40DD-AFC4-6F175D3DCCD1}">
-              <a14:hiddenFill xmlns:a14="http://schemas.microsoft.com/office/drawing/2010/main">
-                <a:solidFill>
-                  <a:srgbClr val="FFFFFF"/>
-                </a:solidFill>
-              </a14:hiddenFill>
-            </a:ext>
-          </a:extLst>
-        </p:spPr>
-      </p:pic>
-      <p:pic>
-        <p:nvPicPr>
-          <p:cNvPr id="1032" name="Picture 8" descr="Resultado de imagen para mac os catalina logo&quot;"/>
-          <p:cNvPicPr>
-            <a:picLocks noChangeAspect="1" noChangeArrowheads="1"/>
-          </p:cNvPicPr>
-          <p:nvPr/>
-        </p:nvPicPr>
-        <p:blipFill>
-          <a:blip r:embed="rId5" cstate="print">
-            <a:extLst>
-              <a:ext uri="{28A0092B-C50C-407E-A947-70E740481C1C}">
-                <a14:useLocalDpi xmlns:a14="http://schemas.microsoft.com/office/drawing/2010/main" val="0"/>
-              </a:ext>
-            </a:extLst>
-          </a:blip>
-          <a:srcRect/>
-          <a:stretch>
-            <a:fillRect/>
-          </a:stretch>
-        </p:blipFill>
-        <p:spPr bwMode="auto">
-          <a:xfrm>
             <a:off x="6817873" y="695173"/>
             <a:ext cx="803853" cy="803853"/>
           </a:xfrm>
@@ -3950,15 +3896,15 @@
               </a:rPr>
               <a:t> y contraseña///</a:t>
             </a:r>
+            <a:endParaRPr lang="es-ES" sz="3000" dirty="0" smtClean="0">
+              <a:solidFill>
+                <a:srgbClr val="E0DDD6"/>
+              </a:solidFill>
+            </a:endParaRPr>
           </a:p>
         </p:txBody>
       </p:sp>
     </p:spTree>
-    <p:extLst>
-      <p:ext uri="{BB962C8B-B14F-4D97-AF65-F5344CB8AC3E}">
-        <p14:creationId xmlns:p14="http://schemas.microsoft.com/office/powerpoint/2010/main" val="2462623777"/>
-      </p:ext>
-    </p:extLst>
   </p:cSld>
   <p:clrMapOvr>
     <a:masterClrMapping/>
@@ -4030,7 +3976,7 @@
           <p:nvPr/>
         </p:nvPicPr>
         <p:blipFill>
-          <a:blip r:embed="rId2">
+          <a:blip r:embed="rId1">
             <a:extLst>
               <a:ext uri="{28A0092B-C50C-407E-A947-70E740481C1C}">
                 <a14:useLocalDpi xmlns:a14="http://schemas.microsoft.com/office/drawing/2010/main" val="0"/>
@@ -4054,6 +4000,47 @@
       <p:pic>
         <p:nvPicPr>
           <p:cNvPr id="1026" name="Picture 2" descr="Resultado de imagen para linux full hd logo&quot;"/>
+          <p:cNvPicPr>
+            <a:picLocks noChangeAspect="1" noChangeArrowheads="1"/>
+          </p:cNvPicPr>
+          <p:nvPr/>
+        </p:nvPicPr>
+        <p:blipFill>
+          <a:blip r:embed="rId2" cstate="print">
+            <a:extLst>
+              <a:ext uri="{28A0092B-C50C-407E-A947-70E740481C1C}">
+                <a14:useLocalDpi xmlns:a14="http://schemas.microsoft.com/office/drawing/2010/main" val="0"/>
+              </a:ext>
+            </a:extLst>
+          </a:blip>
+          <a:srcRect/>
+          <a:stretch>
+            <a:fillRect/>
+          </a:stretch>
+        </p:blipFill>
+        <p:spPr bwMode="auto">
+          <a:xfrm>
+            <a:off x="5778372" y="695173"/>
+            <a:ext cx="622042" cy="746450"/>
+          </a:xfrm>
+          <a:prstGeom prst="rect">
+            <a:avLst/>
+          </a:prstGeom>
+          <a:noFill/>
+          <a:extLst>
+            <a:ext uri="{909E8E84-426E-40DD-AFC4-6F175D3DCCD1}">
+              <a14:hiddenFill xmlns:a14="http://schemas.microsoft.com/office/drawing/2010/main">
+                <a:solidFill>
+                  <a:srgbClr val="FFFFFF"/>
+                </a:solidFill>
+              </a14:hiddenFill>
+            </a:ext>
+          </a:extLst>
+        </p:spPr>
+      </p:pic>
+      <p:pic>
+        <p:nvPicPr>
+          <p:cNvPr id="1030" name="Picture 6" descr="Resultado de imagen para windows logo hd&quot;"/>
           <p:cNvPicPr>
             <a:picLocks noChangeAspect="1" noChangeArrowheads="1"/>
           </p:cNvPicPr>
@@ -4074,8 +4061,8 @@
         </p:blipFill>
         <p:spPr bwMode="auto">
           <a:xfrm>
-            <a:off x="5778372" y="695173"/>
-            <a:ext cx="622042" cy="746450"/>
+            <a:off x="4080047" y="271753"/>
+            <a:ext cx="1609146" cy="1609146"/>
           </a:xfrm>
           <a:prstGeom prst="rect">
             <a:avLst/>
@@ -4094,7 +4081,7 @@
       </p:pic>
       <p:pic>
         <p:nvPicPr>
-          <p:cNvPr id="1030" name="Picture 6" descr="Resultado de imagen para windows logo hd&quot;"/>
+          <p:cNvPr id="1032" name="Picture 8" descr="Resultado de imagen para mac os catalina logo&quot;"/>
           <p:cNvPicPr>
             <a:picLocks noChangeAspect="1" noChangeArrowheads="1"/>
           </p:cNvPicPr>
@@ -4115,47 +4102,6 @@
         </p:blipFill>
         <p:spPr bwMode="auto">
           <a:xfrm>
-            <a:off x="4080047" y="271753"/>
-            <a:ext cx="1609146" cy="1609146"/>
-          </a:xfrm>
-          <a:prstGeom prst="rect">
-            <a:avLst/>
-          </a:prstGeom>
-          <a:noFill/>
-          <a:extLst>
-            <a:ext uri="{909E8E84-426E-40DD-AFC4-6F175D3DCCD1}">
-              <a14:hiddenFill xmlns:a14="http://schemas.microsoft.com/office/drawing/2010/main">
-                <a:solidFill>
-                  <a:srgbClr val="FFFFFF"/>
-                </a:solidFill>
-              </a14:hiddenFill>
-            </a:ext>
-          </a:extLst>
-        </p:spPr>
-      </p:pic>
-      <p:pic>
-        <p:nvPicPr>
-          <p:cNvPr id="1032" name="Picture 8" descr="Resultado de imagen para mac os catalina logo&quot;"/>
-          <p:cNvPicPr>
-            <a:picLocks noChangeAspect="1" noChangeArrowheads="1"/>
-          </p:cNvPicPr>
-          <p:nvPr/>
-        </p:nvPicPr>
-        <p:blipFill>
-          <a:blip r:embed="rId5" cstate="print">
-            <a:extLst>
-              <a:ext uri="{28A0092B-C50C-407E-A947-70E740481C1C}">
-                <a14:useLocalDpi xmlns:a14="http://schemas.microsoft.com/office/drawing/2010/main" val="0"/>
-              </a:ext>
-            </a:extLst>
-          </a:blip>
-          <a:srcRect/>
-          <a:stretch>
-            <a:fillRect/>
-          </a:stretch>
-        </p:blipFill>
-        <p:spPr bwMode="auto">
-          <a:xfrm>
             <a:off x="6817873" y="695173"/>
             <a:ext cx="803853" cy="803853"/>
           </a:xfrm>
@@ -4280,15 +4226,15 @@
               </a:rPr>
               <a:t>Seleccionar programas, y escritorio de posible.</a:t>
             </a:r>
+            <a:endParaRPr lang="es-ES" sz="3000" dirty="0" smtClean="0">
+              <a:solidFill>
+                <a:srgbClr val="E0DDD6"/>
+              </a:solidFill>
+            </a:endParaRPr>
           </a:p>
         </p:txBody>
       </p:sp>
     </p:spTree>
-    <p:extLst>
-      <p:ext uri="{BB962C8B-B14F-4D97-AF65-F5344CB8AC3E}">
-        <p14:creationId xmlns:p14="http://schemas.microsoft.com/office/powerpoint/2010/main" val="2240581663"/>
-      </p:ext>
-    </p:extLst>
   </p:cSld>
   <p:clrMapOvr>
     <a:masterClrMapping/>
@@ -4360,7 +4306,7 @@
           <p:nvPr/>
         </p:nvPicPr>
         <p:blipFill>
-          <a:blip r:embed="rId2">
+          <a:blip r:embed="rId1">
             <a:extLst>
               <a:ext uri="{28A0092B-C50C-407E-A947-70E740481C1C}">
                 <a14:useLocalDpi xmlns:a14="http://schemas.microsoft.com/office/drawing/2010/main" val="0"/>
@@ -4384,6 +4330,47 @@
       <p:pic>
         <p:nvPicPr>
           <p:cNvPr id="1026" name="Picture 2" descr="Resultado de imagen para linux full hd logo&quot;"/>
+          <p:cNvPicPr>
+            <a:picLocks noChangeAspect="1" noChangeArrowheads="1"/>
+          </p:cNvPicPr>
+          <p:nvPr/>
+        </p:nvPicPr>
+        <p:blipFill>
+          <a:blip r:embed="rId2" cstate="print">
+            <a:extLst>
+              <a:ext uri="{28A0092B-C50C-407E-A947-70E740481C1C}">
+                <a14:useLocalDpi xmlns:a14="http://schemas.microsoft.com/office/drawing/2010/main" val="0"/>
+              </a:ext>
+            </a:extLst>
+          </a:blip>
+          <a:srcRect/>
+          <a:stretch>
+            <a:fillRect/>
+          </a:stretch>
+        </p:blipFill>
+        <p:spPr bwMode="auto">
+          <a:xfrm>
+            <a:off x="5778372" y="695173"/>
+            <a:ext cx="622042" cy="746450"/>
+          </a:xfrm>
+          <a:prstGeom prst="rect">
+            <a:avLst/>
+          </a:prstGeom>
+          <a:noFill/>
+          <a:extLst>
+            <a:ext uri="{909E8E84-426E-40DD-AFC4-6F175D3DCCD1}">
+              <a14:hiddenFill xmlns:a14="http://schemas.microsoft.com/office/drawing/2010/main">
+                <a:solidFill>
+                  <a:srgbClr val="FFFFFF"/>
+                </a:solidFill>
+              </a14:hiddenFill>
+            </a:ext>
+          </a:extLst>
+        </p:spPr>
+      </p:pic>
+      <p:pic>
+        <p:nvPicPr>
+          <p:cNvPr id="1030" name="Picture 6" descr="Resultado de imagen para windows logo hd&quot;"/>
           <p:cNvPicPr>
             <a:picLocks noChangeAspect="1" noChangeArrowheads="1"/>
           </p:cNvPicPr>
@@ -4404,8 +4391,8 @@
         </p:blipFill>
         <p:spPr bwMode="auto">
           <a:xfrm>
-            <a:off x="5778372" y="695173"/>
-            <a:ext cx="622042" cy="746450"/>
+            <a:off x="4080047" y="271753"/>
+            <a:ext cx="1609146" cy="1609146"/>
           </a:xfrm>
           <a:prstGeom prst="rect">
             <a:avLst/>
@@ -4424,7 +4411,7 @@
       </p:pic>
       <p:pic>
         <p:nvPicPr>
-          <p:cNvPr id="1030" name="Picture 6" descr="Resultado de imagen para windows logo hd&quot;"/>
+          <p:cNvPr id="1032" name="Picture 8" descr="Resultado de imagen para mac os catalina logo&quot;"/>
           <p:cNvPicPr>
             <a:picLocks noChangeAspect="1" noChangeArrowheads="1"/>
           </p:cNvPicPr>
@@ -4445,8 +4432,8 @@
         </p:blipFill>
         <p:spPr bwMode="auto">
           <a:xfrm>
-            <a:off x="4080047" y="271753"/>
-            <a:ext cx="1609146" cy="1609146"/>
+            <a:off x="6817873" y="695173"/>
+            <a:ext cx="803853" cy="803853"/>
           </a:xfrm>
           <a:prstGeom prst="rect">
             <a:avLst/>
@@ -4463,16 +4450,597 @@
           </a:extLst>
         </p:spPr>
       </p:pic>
+      <p:sp>
+        <p:nvSpPr>
+          <p:cNvPr id="10" name="CuadroTexto 9"/>
+          <p:cNvSpPr txBox="1"/>
+          <p:nvPr/>
+        </p:nvSpPr>
+        <p:spPr>
+          <a:xfrm>
+            <a:off x="4582378" y="6315419"/>
+            <a:ext cx="3014030" cy="369332"/>
+          </a:xfrm>
+          <a:prstGeom prst="rect">
+            <a:avLst/>
+          </a:prstGeom>
+          <a:noFill/>
+        </p:spPr>
+        <p:txBody>
+          <a:bodyPr wrap="none" rtlCol="0">
+            <a:spAutoFit/>
+          </a:bodyPr>
+          <a:lstStyle/>
+          <a:p>
+            <a:r>
+              <a:rPr lang="es-ES" dirty="0" smtClean="0">
+                <a:solidFill>
+                  <a:srgbClr val="897F66"/>
+                </a:solidFill>
+              </a:rPr>
+              <a:t>Daniel Alejandro Rojas Artiaga</a:t>
+            </a:r>
+            <a:endParaRPr lang="es-MX" dirty="0">
+              <a:solidFill>
+                <a:srgbClr val="897F66"/>
+              </a:solidFill>
+            </a:endParaRPr>
+          </a:p>
+        </p:txBody>
+      </p:sp>
+      <p:sp>
+        <p:nvSpPr>
+          <p:cNvPr id="11" name="CuadroTexto 10"/>
+          <p:cNvSpPr txBox="1"/>
+          <p:nvPr/>
+        </p:nvSpPr>
+        <p:spPr>
+          <a:xfrm>
+            <a:off x="4988324" y="174453"/>
+            <a:ext cx="2215352" cy="523220"/>
+          </a:xfrm>
+          <a:prstGeom prst="rect">
+            <a:avLst/>
+          </a:prstGeom>
+          <a:noFill/>
+        </p:spPr>
+        <p:txBody>
+          <a:bodyPr wrap="square" rtlCol="0">
+            <a:spAutoFit/>
+          </a:bodyPr>
+          <a:lstStyle/>
+          <a:p>
+            <a:r>
+              <a:rPr lang="es-ES" sz="2800" dirty="0" smtClean="0">
+                <a:solidFill>
+                  <a:srgbClr val="E0DDD6"/>
+                </a:solidFill>
+              </a:rPr>
+              <a:t>Quinta Clase</a:t>
+            </a:r>
+            <a:endParaRPr lang="es-MX" sz="2800" dirty="0">
+              <a:solidFill>
+                <a:srgbClr val="E0DDD6"/>
+              </a:solidFill>
+            </a:endParaRPr>
+          </a:p>
+        </p:txBody>
+      </p:sp>
+      <p:sp>
+        <p:nvSpPr>
+          <p:cNvPr id="13" name="Rectángulo 12"/>
+          <p:cNvSpPr/>
+          <p:nvPr/>
+        </p:nvSpPr>
+        <p:spPr>
+          <a:xfrm>
+            <a:off x="1921047" y="1880899"/>
+            <a:ext cx="8336692" cy="1014730"/>
+          </a:xfrm>
+          <a:prstGeom prst="rect">
+            <a:avLst/>
+          </a:prstGeom>
+        </p:spPr>
+        <p:txBody>
+          <a:bodyPr wrap="square">
+            <a:spAutoFit/>
+          </a:bodyPr>
+          <a:lstStyle/>
+          <a:p>
+            <a:pPr algn="ctr"/>
+            <a:r>
+              <a:rPr lang="es-ES" sz="3000" dirty="0" smtClean="0">
+                <a:solidFill>
+                  <a:srgbClr val="E0DDD6"/>
+                </a:solidFill>
+              </a:rPr>
+              <a:t>Grandes diferencias </a:t>
+            </a:r>
+            <a:endParaRPr lang="es-ES" sz="3000" dirty="0" smtClean="0">
+              <a:solidFill>
+                <a:srgbClr val="E0DDD6"/>
+              </a:solidFill>
+            </a:endParaRPr>
+          </a:p>
+          <a:p>
+            <a:pPr algn="ctr"/>
+            <a:r>
+              <a:rPr lang="es-ES" sz="3000" dirty="0" smtClean="0">
+                <a:solidFill>
+                  <a:srgbClr val="E0DDD6"/>
+                </a:solidFill>
+              </a:rPr>
+              <a:t>Directorios de archivos</a:t>
+            </a:r>
+            <a:endParaRPr lang="es-ES" sz="3000" dirty="0" smtClean="0">
+              <a:solidFill>
+                <a:srgbClr val="E0DDD6"/>
+              </a:solidFill>
+            </a:endParaRPr>
+          </a:p>
+        </p:txBody>
+      </p:sp>
       <p:pic>
         <p:nvPicPr>
-          <p:cNvPr id="1032" name="Picture 8" descr="Resultado de imagen para mac os catalina logo&quot;"/>
+          <p:cNvPr id="5" name="Imagen 4"/>
+          <p:cNvPicPr>
+            <a:picLocks noChangeAspect="1"/>
+          </p:cNvPicPr>
+          <p:nvPr/>
+        </p:nvPicPr>
+        <p:blipFill>
+          <a:blip r:embed="rId5"/>
+          <a:stretch>
+            <a:fillRect/>
+          </a:stretch>
+        </p:blipFill>
+        <p:spPr>
+          <a:xfrm>
+            <a:off x="3347720" y="899795"/>
+            <a:ext cx="5495925" cy="5057775"/>
+          </a:xfrm>
+          <a:prstGeom prst="rect">
+            <a:avLst/>
+          </a:prstGeom>
+        </p:spPr>
+      </p:pic>
+    </p:spTree>
+  </p:cSld>
+  <p:clrMapOvr>
+    <a:masterClrMapping/>
+  </p:clrMapOvr>
+</p:sld>
+</file>
+
+<file path=ppt/slides/slide14.xml><?xml version="1.0" encoding="utf-8"?>
+<p:sld xmlns:a="http://schemas.openxmlformats.org/drawingml/2006/main" xmlns:r="http://schemas.openxmlformats.org/officeDocument/2006/relationships" xmlns:p="http://schemas.openxmlformats.org/presentationml/2006/main">
+  <p:cSld>
+    <p:spTree>
+      <p:nvGrpSpPr>
+        <p:cNvPr id="1" name=""/>
+        <p:cNvGrpSpPr/>
+        <p:nvPr/>
+      </p:nvGrpSpPr>
+      <p:grpSpPr>
+        <a:xfrm>
+          <a:off x="0" y="0"/>
+          <a:ext cx="0" cy="0"/>
+          <a:chOff x="0" y="0"/>
+          <a:chExt cx="0" cy="0"/>
+        </a:xfrm>
+      </p:grpSpPr>
+      <p:sp>
+        <p:nvSpPr>
+          <p:cNvPr id="2" name="Título 1"/>
+          <p:cNvSpPr>
+            <a:spLocks noGrp="1"/>
+          </p:cNvSpPr>
+          <p:nvPr>
+            <p:ph type="ctrTitle"/>
+          </p:nvPr>
+        </p:nvSpPr>
+        <p:spPr/>
+        <p:txBody>
+          <a:bodyPr/>
+          <a:lstStyle/>
+          <a:p>
+            <a:endParaRPr lang="es-MX"/>
+          </a:p>
+        </p:txBody>
+      </p:sp>
+      <p:sp>
+        <p:nvSpPr>
+          <p:cNvPr id="3" name="Subtítulo 2"/>
+          <p:cNvSpPr>
+            <a:spLocks noGrp="1"/>
+          </p:cNvSpPr>
+          <p:nvPr>
+            <p:ph type="subTitle" idx="1"/>
+          </p:nvPr>
+        </p:nvSpPr>
+        <p:spPr/>
+        <p:txBody>
+          <a:bodyPr/>
+          <a:lstStyle/>
+          <a:p>
+            <a:endParaRPr lang="es-MX"/>
+          </a:p>
+        </p:txBody>
+      </p:sp>
+      <p:pic>
+        <p:nvPicPr>
+          <p:cNvPr id="4" name="Imagen 3"/>
+          <p:cNvPicPr>
+            <a:picLocks noChangeAspect="1"/>
+          </p:cNvPicPr>
+          <p:nvPr/>
+        </p:nvPicPr>
+        <p:blipFill>
+          <a:blip r:embed="rId1">
+            <a:extLst>
+              <a:ext uri="{28A0092B-C50C-407E-A947-70E740481C1C}">
+                <a14:useLocalDpi xmlns:a14="http://schemas.microsoft.com/office/drawing/2010/main" val="0"/>
+              </a:ext>
+            </a:extLst>
+          </a:blip>
+          <a:stretch>
+            <a:fillRect/>
+          </a:stretch>
+        </p:blipFill>
+        <p:spPr>
+          <a:xfrm>
+            <a:off x="-6607" y="-8238"/>
+            <a:ext cx="12192000" cy="6858000"/>
+          </a:xfrm>
+          <a:prstGeom prst="rect">
+            <a:avLst/>
+          </a:prstGeom>
+        </p:spPr>
+      </p:pic>
+      <p:sp>
+        <p:nvSpPr>
+          <p:cNvPr id="10" name="CuadroTexto 9"/>
+          <p:cNvSpPr txBox="1"/>
+          <p:nvPr/>
+        </p:nvSpPr>
+        <p:spPr>
+          <a:xfrm>
+            <a:off x="4582378" y="6315419"/>
+            <a:ext cx="3014030" cy="369332"/>
+          </a:xfrm>
+          <a:prstGeom prst="rect">
+            <a:avLst/>
+          </a:prstGeom>
+          <a:noFill/>
+        </p:spPr>
+        <p:txBody>
+          <a:bodyPr wrap="none" rtlCol="0">
+            <a:spAutoFit/>
+          </a:bodyPr>
+          <a:lstStyle/>
+          <a:p>
+            <a:r>
+              <a:rPr lang="es-ES" dirty="0" smtClean="0">
+                <a:solidFill>
+                  <a:srgbClr val="897F66"/>
+                </a:solidFill>
+              </a:rPr>
+              <a:t>Daniel Alejandro Rojas Artiaga</a:t>
+            </a:r>
+            <a:endParaRPr lang="es-MX" dirty="0">
+              <a:solidFill>
+                <a:srgbClr val="897F66"/>
+              </a:solidFill>
+            </a:endParaRPr>
+          </a:p>
+        </p:txBody>
+      </p:sp>
+      <p:pic>
+        <p:nvPicPr>
+          <p:cNvPr id="7" name="Imagen 6"/>
+          <p:cNvPicPr>
+            <a:picLocks noChangeAspect="1"/>
+          </p:cNvPicPr>
+          <p:nvPr/>
+        </p:nvPicPr>
+        <p:blipFill>
+          <a:blip r:embed="rId2"/>
+          <a:stretch>
+            <a:fillRect/>
+          </a:stretch>
+        </p:blipFill>
+        <p:spPr>
+          <a:xfrm>
+            <a:off x="3267075" y="513080"/>
+            <a:ext cx="6185535" cy="5373370"/>
+          </a:xfrm>
+          <a:prstGeom prst="rect">
+            <a:avLst/>
+          </a:prstGeom>
+        </p:spPr>
+      </p:pic>
+    </p:spTree>
+  </p:cSld>
+  <p:clrMapOvr>
+    <a:masterClrMapping/>
+  </p:clrMapOvr>
+</p:sld>
+</file>
+
+<file path=ppt/slides/slide15.xml><?xml version="1.0" encoding="utf-8"?>
+<p:sld xmlns:a="http://schemas.openxmlformats.org/drawingml/2006/main" xmlns:r="http://schemas.openxmlformats.org/officeDocument/2006/relationships" xmlns:p="http://schemas.openxmlformats.org/presentationml/2006/main">
+  <p:cSld>
+    <p:spTree>
+      <p:nvGrpSpPr>
+        <p:cNvPr id="1" name=""/>
+        <p:cNvGrpSpPr/>
+        <p:nvPr/>
+      </p:nvGrpSpPr>
+      <p:grpSpPr>
+        <a:xfrm>
+          <a:off x="0" y="0"/>
+          <a:ext cx="0" cy="0"/>
+          <a:chOff x="0" y="0"/>
+          <a:chExt cx="0" cy="0"/>
+        </a:xfrm>
+      </p:grpSpPr>
+      <p:sp>
+        <p:nvSpPr>
+          <p:cNvPr id="2" name="Título 1"/>
+          <p:cNvSpPr>
+            <a:spLocks noGrp="1"/>
+          </p:cNvSpPr>
+          <p:nvPr>
+            <p:ph type="ctrTitle"/>
+          </p:nvPr>
+        </p:nvSpPr>
+        <p:spPr/>
+        <p:txBody>
+          <a:bodyPr/>
+          <a:lstStyle/>
+          <a:p>
+            <a:endParaRPr lang="es-MX"/>
+          </a:p>
+        </p:txBody>
+      </p:sp>
+      <p:sp>
+        <p:nvSpPr>
+          <p:cNvPr id="3" name="Subtítulo 2"/>
+          <p:cNvSpPr>
+            <a:spLocks noGrp="1"/>
+          </p:cNvSpPr>
+          <p:nvPr>
+            <p:ph type="subTitle" idx="1"/>
+          </p:nvPr>
+        </p:nvSpPr>
+        <p:spPr/>
+        <p:txBody>
+          <a:bodyPr/>
+          <a:lstStyle/>
+          <a:p>
+            <a:endParaRPr lang="es-MX"/>
+          </a:p>
+        </p:txBody>
+      </p:sp>
+      <p:pic>
+        <p:nvPicPr>
+          <p:cNvPr id="4" name="Imagen 3"/>
+          <p:cNvPicPr>
+            <a:picLocks noChangeAspect="1"/>
+          </p:cNvPicPr>
+          <p:nvPr/>
+        </p:nvPicPr>
+        <p:blipFill>
+          <a:blip r:embed="rId1">
+            <a:extLst>
+              <a:ext uri="{28A0092B-C50C-407E-A947-70E740481C1C}">
+                <a14:useLocalDpi xmlns:a14="http://schemas.microsoft.com/office/drawing/2010/main" val="0"/>
+              </a:ext>
+            </a:extLst>
+          </a:blip>
+          <a:stretch>
+            <a:fillRect/>
+          </a:stretch>
+        </p:blipFill>
+        <p:spPr>
+          <a:xfrm>
+            <a:off x="-6607" y="-8238"/>
+            <a:ext cx="12192000" cy="6858000"/>
+          </a:xfrm>
+          <a:prstGeom prst="rect">
+            <a:avLst/>
+          </a:prstGeom>
+        </p:spPr>
+      </p:pic>
+      <p:sp>
+        <p:nvSpPr>
+          <p:cNvPr id="10" name="CuadroTexto 9"/>
+          <p:cNvSpPr txBox="1"/>
+          <p:nvPr/>
+        </p:nvSpPr>
+        <p:spPr>
+          <a:xfrm>
+            <a:off x="4582378" y="6315419"/>
+            <a:ext cx="3014030" cy="369332"/>
+          </a:xfrm>
+          <a:prstGeom prst="rect">
+            <a:avLst/>
+          </a:prstGeom>
+          <a:noFill/>
+        </p:spPr>
+        <p:txBody>
+          <a:bodyPr wrap="none" rtlCol="0">
+            <a:spAutoFit/>
+          </a:bodyPr>
+          <a:lstStyle/>
+          <a:p>
+            <a:r>
+              <a:rPr lang="es-ES" dirty="0" smtClean="0">
+                <a:solidFill>
+                  <a:srgbClr val="897F66"/>
+                </a:solidFill>
+              </a:rPr>
+              <a:t>Daniel Alejandro Rojas Artiaga</a:t>
+            </a:r>
+            <a:endParaRPr lang="es-MX" dirty="0">
+              <a:solidFill>
+                <a:srgbClr val="897F66"/>
+              </a:solidFill>
+            </a:endParaRPr>
+          </a:p>
+        </p:txBody>
+      </p:sp>
+      <p:pic>
+        <p:nvPicPr>
+          <p:cNvPr id="5" name="Imagen 4"/>
+          <p:cNvPicPr>
+            <a:picLocks noChangeAspect="1"/>
+          </p:cNvPicPr>
+          <p:nvPr/>
+        </p:nvPicPr>
+        <p:blipFill>
+          <a:blip r:embed="rId2"/>
+          <a:stretch>
+            <a:fillRect/>
+          </a:stretch>
+        </p:blipFill>
+        <p:spPr>
+          <a:xfrm>
+            <a:off x="5605145" y="200025"/>
+            <a:ext cx="6210935" cy="5716270"/>
+          </a:xfrm>
+          <a:prstGeom prst="rect">
+            <a:avLst/>
+          </a:prstGeom>
+        </p:spPr>
+      </p:pic>
+      <p:pic>
+        <p:nvPicPr>
+          <p:cNvPr id="6" name="Imagen 5"/>
+          <p:cNvPicPr>
+            <a:picLocks noChangeAspect="1"/>
+          </p:cNvPicPr>
+          <p:nvPr/>
+        </p:nvPicPr>
+        <p:blipFill>
+          <a:blip r:embed="rId3"/>
+          <a:stretch>
+            <a:fillRect/>
+          </a:stretch>
+        </p:blipFill>
+        <p:spPr>
+          <a:xfrm>
+            <a:off x="42545" y="1286510"/>
+            <a:ext cx="5562600" cy="3324225"/>
+          </a:xfrm>
+          <a:prstGeom prst="rect">
+            <a:avLst/>
+          </a:prstGeom>
+        </p:spPr>
+      </p:pic>
+    </p:spTree>
+  </p:cSld>
+  <p:clrMapOvr>
+    <a:masterClrMapping/>
+  </p:clrMapOvr>
+</p:sld>
+</file>
+
+<file path=ppt/slides/slide16.xml><?xml version="1.0" encoding="utf-8"?>
+<p:sld xmlns:a="http://schemas.openxmlformats.org/drawingml/2006/main" xmlns:r="http://schemas.openxmlformats.org/officeDocument/2006/relationships" xmlns:p="http://schemas.openxmlformats.org/presentationml/2006/main">
+  <p:cSld>
+    <p:spTree>
+      <p:nvGrpSpPr>
+        <p:cNvPr id="1" name=""/>
+        <p:cNvGrpSpPr/>
+        <p:nvPr/>
+      </p:nvGrpSpPr>
+      <p:grpSpPr>
+        <a:xfrm>
+          <a:off x="0" y="0"/>
+          <a:ext cx="0" cy="0"/>
+          <a:chOff x="0" y="0"/>
+          <a:chExt cx="0" cy="0"/>
+        </a:xfrm>
+      </p:grpSpPr>
+      <p:sp>
+        <p:nvSpPr>
+          <p:cNvPr id="2" name="Título 1"/>
+          <p:cNvSpPr>
+            <a:spLocks noGrp="1"/>
+          </p:cNvSpPr>
+          <p:nvPr>
+            <p:ph type="ctrTitle"/>
+          </p:nvPr>
+        </p:nvSpPr>
+        <p:spPr/>
+        <p:txBody>
+          <a:bodyPr/>
+          <a:lstStyle/>
+          <a:p>
+            <a:endParaRPr lang="es-MX"/>
+          </a:p>
+        </p:txBody>
+      </p:sp>
+      <p:sp>
+        <p:nvSpPr>
+          <p:cNvPr id="3" name="Subtítulo 2"/>
+          <p:cNvSpPr>
+            <a:spLocks noGrp="1"/>
+          </p:cNvSpPr>
+          <p:nvPr>
+            <p:ph type="subTitle" idx="1"/>
+          </p:nvPr>
+        </p:nvSpPr>
+        <p:spPr/>
+        <p:txBody>
+          <a:bodyPr/>
+          <a:lstStyle/>
+          <a:p>
+            <a:endParaRPr lang="es-MX"/>
+          </a:p>
+        </p:txBody>
+      </p:sp>
+      <p:pic>
+        <p:nvPicPr>
+          <p:cNvPr id="4" name="Imagen 3"/>
+          <p:cNvPicPr>
+            <a:picLocks noChangeAspect="1"/>
+          </p:cNvPicPr>
+          <p:nvPr/>
+        </p:nvPicPr>
+        <p:blipFill>
+          <a:blip r:embed="rId1">
+            <a:extLst>
+              <a:ext uri="{28A0092B-C50C-407E-A947-70E740481C1C}">
+                <a14:useLocalDpi xmlns:a14="http://schemas.microsoft.com/office/drawing/2010/main" val="0"/>
+              </a:ext>
+            </a:extLst>
+          </a:blip>
+          <a:stretch>
+            <a:fillRect/>
+          </a:stretch>
+        </p:blipFill>
+        <p:spPr>
+          <a:xfrm>
+            <a:off x="-6607" y="-8238"/>
+            <a:ext cx="12192000" cy="6858000"/>
+          </a:xfrm>
+          <a:prstGeom prst="rect">
+            <a:avLst/>
+          </a:prstGeom>
+        </p:spPr>
+      </p:pic>
+      <p:pic>
+        <p:nvPicPr>
+          <p:cNvPr id="1026" name="Picture 2" descr="Resultado de imagen para linux full hd logo&quot;"/>
           <p:cNvPicPr>
             <a:picLocks noChangeAspect="1" noChangeArrowheads="1"/>
           </p:cNvPicPr>
           <p:nvPr/>
         </p:nvPicPr>
         <p:blipFill>
-          <a:blip r:embed="rId5" cstate="print">
+          <a:blip r:embed="rId2" cstate="print">
             <a:extLst>
               <a:ext uri="{28A0092B-C50C-407E-A947-70E740481C1C}">
                 <a14:useLocalDpi xmlns:a14="http://schemas.microsoft.com/office/drawing/2010/main" val="0"/>
@@ -4486,6 +5054,88 @@
         </p:blipFill>
         <p:spPr bwMode="auto">
           <a:xfrm>
+            <a:off x="5778372" y="695173"/>
+            <a:ext cx="622042" cy="746450"/>
+          </a:xfrm>
+          <a:prstGeom prst="rect">
+            <a:avLst/>
+          </a:prstGeom>
+          <a:noFill/>
+          <a:extLst>
+            <a:ext uri="{909E8E84-426E-40DD-AFC4-6F175D3DCCD1}">
+              <a14:hiddenFill xmlns:a14="http://schemas.microsoft.com/office/drawing/2010/main">
+                <a:solidFill>
+                  <a:srgbClr val="FFFFFF"/>
+                </a:solidFill>
+              </a14:hiddenFill>
+            </a:ext>
+          </a:extLst>
+        </p:spPr>
+      </p:pic>
+      <p:pic>
+        <p:nvPicPr>
+          <p:cNvPr id="1030" name="Picture 6" descr="Resultado de imagen para windows logo hd&quot;"/>
+          <p:cNvPicPr>
+            <a:picLocks noChangeAspect="1" noChangeArrowheads="1"/>
+          </p:cNvPicPr>
+          <p:nvPr/>
+        </p:nvPicPr>
+        <p:blipFill>
+          <a:blip r:embed="rId3" cstate="print">
+            <a:extLst>
+              <a:ext uri="{28A0092B-C50C-407E-A947-70E740481C1C}">
+                <a14:useLocalDpi xmlns:a14="http://schemas.microsoft.com/office/drawing/2010/main" val="0"/>
+              </a:ext>
+            </a:extLst>
+          </a:blip>
+          <a:srcRect/>
+          <a:stretch>
+            <a:fillRect/>
+          </a:stretch>
+        </p:blipFill>
+        <p:spPr bwMode="auto">
+          <a:xfrm>
+            <a:off x="4080047" y="271753"/>
+            <a:ext cx="1609146" cy="1609146"/>
+          </a:xfrm>
+          <a:prstGeom prst="rect">
+            <a:avLst/>
+          </a:prstGeom>
+          <a:noFill/>
+          <a:extLst>
+            <a:ext uri="{909E8E84-426E-40DD-AFC4-6F175D3DCCD1}">
+              <a14:hiddenFill xmlns:a14="http://schemas.microsoft.com/office/drawing/2010/main">
+                <a:solidFill>
+                  <a:srgbClr val="FFFFFF"/>
+                </a:solidFill>
+              </a14:hiddenFill>
+            </a:ext>
+          </a:extLst>
+        </p:spPr>
+      </p:pic>
+      <p:pic>
+        <p:nvPicPr>
+          <p:cNvPr id="1032" name="Picture 8" descr="Resultado de imagen para mac os catalina logo&quot;"/>
+          <p:cNvPicPr>
+            <a:picLocks noChangeAspect="1" noChangeArrowheads="1"/>
+          </p:cNvPicPr>
+          <p:nvPr/>
+        </p:nvPicPr>
+        <p:blipFill>
+          <a:blip r:embed="rId4" cstate="print">
+            <a:extLst>
+              <a:ext uri="{28A0092B-C50C-407E-A947-70E740481C1C}">
+                <a14:useLocalDpi xmlns:a14="http://schemas.microsoft.com/office/drawing/2010/main" val="0"/>
+              </a:ext>
+            </a:extLst>
+          </a:blip>
+          <a:srcRect/>
+          <a:stretch>
+            <a:fillRect/>
+          </a:stretch>
+        </p:blipFill>
+        <p:spPr bwMode="auto">
+          <a:xfrm>
             <a:off x="6817873" y="695173"/>
             <a:ext cx="803853" cy="803853"/>
           </a:xfrm>
@@ -4589,7 +5239,7 @@
         <p:spPr>
           <a:xfrm>
             <a:off x="1921047" y="1880899"/>
-            <a:ext cx="8336692" cy="2215991"/>
+            <a:ext cx="8336692" cy="553085"/>
           </a:xfrm>
           <a:prstGeom prst="rect">
             <a:avLst/>
@@ -4603,74 +5253,12 @@
           <a:p>
             <a:pPr algn="ctr"/>
             <a:r>
-              <a:rPr lang="es-ES" sz="4800" dirty="0" smtClean="0">
+              <a:rPr lang="es-ES" sz="3000" dirty="0" smtClean="0">
                 <a:solidFill>
                   <a:srgbClr val="E0DDD6"/>
                 </a:solidFill>
               </a:rPr>
-              <a:t>Tarea</a:t>
-            </a:r>
-          </a:p>
-          <a:p>
-            <a:pPr algn="ctr"/>
-            <a:r>
-              <a:rPr lang="es-ES" sz="3000" dirty="0" smtClean="0">
-                <a:solidFill>
-                  <a:srgbClr val="E0DDD6"/>
-                </a:solidFill>
-              </a:rPr>
-              <a:t>// </a:t>
-            </a:r>
-            <a:r>
-              <a:rPr lang="es-ES" sz="3000" dirty="0">
-                <a:solidFill>
-                  <a:srgbClr val="E0DDD6"/>
-                </a:solidFill>
-              </a:rPr>
-              <a:t>de tarea se les deja buscar los </a:t>
-            </a:r>
-            <a:r>
-              <a:rPr lang="es-ES" sz="3000" dirty="0" smtClean="0">
-                <a:solidFill>
-                  <a:srgbClr val="E0DDD6"/>
-                </a:solidFill>
-              </a:rPr>
-              <a:t>códigos </a:t>
-            </a:r>
-            <a:r>
-              <a:rPr lang="es-ES" sz="3000" dirty="0">
-                <a:solidFill>
-                  <a:srgbClr val="E0DDD6"/>
-                </a:solidFill>
-              </a:rPr>
-              <a:t>mas utilizados en </a:t>
-            </a:r>
-            <a:r>
-              <a:rPr lang="es-ES" sz="3000" dirty="0" err="1" smtClean="0">
-                <a:solidFill>
-                  <a:srgbClr val="E0DDD6"/>
-                </a:solidFill>
-              </a:rPr>
-              <a:t>bash</a:t>
-            </a:r>
-            <a:r>
-              <a:rPr lang="es-ES" sz="3000" dirty="0" smtClean="0">
-                <a:solidFill>
-                  <a:srgbClr val="E0DDD6"/>
-                </a:solidFill>
-              </a:rPr>
-              <a:t>//</a:t>
-            </a:r>
-          </a:p>
-          <a:p>
-            <a:pPr algn="ctr"/>
-            <a:r>
-              <a:rPr lang="es-ES" sz="3000" dirty="0" smtClean="0">
-                <a:solidFill>
-                  <a:srgbClr val="E0DDD6"/>
-                </a:solidFill>
-              </a:rPr>
-              <a:t>//Investigar que es SSH y como conectar//</a:t>
+              <a:t>Gestores de paquetes</a:t>
             </a:r>
             <a:endParaRPr lang="es-ES" sz="3000" dirty="0" smtClean="0">
               <a:solidFill>
@@ -4681,11 +5269,408 @@
         </p:txBody>
       </p:sp>
     </p:spTree>
-    <p:extLst>
-      <p:ext uri="{BB962C8B-B14F-4D97-AF65-F5344CB8AC3E}">
-        <p14:creationId xmlns:p14="http://schemas.microsoft.com/office/powerpoint/2010/main" val="2973115817"/>
-      </p:ext>
-    </p:extLst>
+  </p:cSld>
+  <p:clrMapOvr>
+    <a:masterClrMapping/>
+  </p:clrMapOvr>
+</p:sld>
+</file>
+
+<file path=ppt/slides/slide17.xml><?xml version="1.0" encoding="utf-8"?>
+<p:sld xmlns:a="http://schemas.openxmlformats.org/drawingml/2006/main" xmlns:r="http://schemas.openxmlformats.org/officeDocument/2006/relationships" xmlns:p="http://schemas.openxmlformats.org/presentationml/2006/main">
+  <p:cSld>
+    <p:spTree>
+      <p:nvGrpSpPr>
+        <p:cNvPr id="1" name=""/>
+        <p:cNvGrpSpPr/>
+        <p:nvPr/>
+      </p:nvGrpSpPr>
+      <p:grpSpPr>
+        <a:xfrm>
+          <a:off x="0" y="0"/>
+          <a:ext cx="0" cy="0"/>
+          <a:chOff x="0" y="0"/>
+          <a:chExt cx="0" cy="0"/>
+        </a:xfrm>
+      </p:grpSpPr>
+      <p:sp>
+        <p:nvSpPr>
+          <p:cNvPr id="2" name="Título 1"/>
+          <p:cNvSpPr>
+            <a:spLocks noGrp="1"/>
+          </p:cNvSpPr>
+          <p:nvPr>
+            <p:ph type="ctrTitle"/>
+          </p:nvPr>
+        </p:nvSpPr>
+        <p:spPr/>
+        <p:txBody>
+          <a:bodyPr/>
+          <a:lstStyle/>
+          <a:p>
+            <a:endParaRPr lang="es-MX"/>
+          </a:p>
+        </p:txBody>
+      </p:sp>
+      <p:sp>
+        <p:nvSpPr>
+          <p:cNvPr id="3" name="Subtítulo 2"/>
+          <p:cNvSpPr>
+            <a:spLocks noGrp="1"/>
+          </p:cNvSpPr>
+          <p:nvPr>
+            <p:ph type="subTitle" idx="1"/>
+          </p:nvPr>
+        </p:nvSpPr>
+        <p:spPr/>
+        <p:txBody>
+          <a:bodyPr/>
+          <a:lstStyle/>
+          <a:p>
+            <a:endParaRPr lang="es-MX"/>
+          </a:p>
+        </p:txBody>
+      </p:sp>
+      <p:pic>
+        <p:nvPicPr>
+          <p:cNvPr id="4" name="Imagen 3"/>
+          <p:cNvPicPr>
+            <a:picLocks noChangeAspect="1"/>
+          </p:cNvPicPr>
+          <p:nvPr/>
+        </p:nvPicPr>
+        <p:blipFill>
+          <a:blip r:embed="rId1">
+            <a:extLst>
+              <a:ext uri="{28A0092B-C50C-407E-A947-70E740481C1C}">
+                <a14:useLocalDpi xmlns:a14="http://schemas.microsoft.com/office/drawing/2010/main" val="0"/>
+              </a:ext>
+            </a:extLst>
+          </a:blip>
+          <a:stretch>
+            <a:fillRect/>
+          </a:stretch>
+        </p:blipFill>
+        <p:spPr>
+          <a:xfrm>
+            <a:off x="-6607" y="-8238"/>
+            <a:ext cx="12192000" cy="6858000"/>
+          </a:xfrm>
+          <a:prstGeom prst="rect">
+            <a:avLst/>
+          </a:prstGeom>
+        </p:spPr>
+      </p:pic>
+      <p:pic>
+        <p:nvPicPr>
+          <p:cNvPr id="1026" name="Picture 2" descr="Resultado de imagen para linux full hd logo&quot;"/>
+          <p:cNvPicPr>
+            <a:picLocks noChangeAspect="1" noChangeArrowheads="1"/>
+          </p:cNvPicPr>
+          <p:nvPr/>
+        </p:nvPicPr>
+        <p:blipFill>
+          <a:blip r:embed="rId2" cstate="print">
+            <a:extLst>
+              <a:ext uri="{28A0092B-C50C-407E-A947-70E740481C1C}">
+                <a14:useLocalDpi xmlns:a14="http://schemas.microsoft.com/office/drawing/2010/main" val="0"/>
+              </a:ext>
+            </a:extLst>
+          </a:blip>
+          <a:srcRect/>
+          <a:stretch>
+            <a:fillRect/>
+          </a:stretch>
+        </p:blipFill>
+        <p:spPr bwMode="auto">
+          <a:xfrm>
+            <a:off x="5778372" y="695173"/>
+            <a:ext cx="622042" cy="746450"/>
+          </a:xfrm>
+          <a:prstGeom prst="rect">
+            <a:avLst/>
+          </a:prstGeom>
+          <a:noFill/>
+          <a:extLst>
+            <a:ext uri="{909E8E84-426E-40DD-AFC4-6F175D3DCCD1}">
+              <a14:hiddenFill xmlns:a14="http://schemas.microsoft.com/office/drawing/2010/main">
+                <a:solidFill>
+                  <a:srgbClr val="FFFFFF"/>
+                </a:solidFill>
+              </a14:hiddenFill>
+            </a:ext>
+          </a:extLst>
+        </p:spPr>
+      </p:pic>
+      <p:pic>
+        <p:nvPicPr>
+          <p:cNvPr id="1030" name="Picture 6" descr="Resultado de imagen para windows logo hd&quot;"/>
+          <p:cNvPicPr>
+            <a:picLocks noChangeAspect="1" noChangeArrowheads="1"/>
+          </p:cNvPicPr>
+          <p:nvPr/>
+        </p:nvPicPr>
+        <p:blipFill>
+          <a:blip r:embed="rId3" cstate="print">
+            <a:extLst>
+              <a:ext uri="{28A0092B-C50C-407E-A947-70E740481C1C}">
+                <a14:useLocalDpi xmlns:a14="http://schemas.microsoft.com/office/drawing/2010/main" val="0"/>
+              </a:ext>
+            </a:extLst>
+          </a:blip>
+          <a:srcRect/>
+          <a:stretch>
+            <a:fillRect/>
+          </a:stretch>
+        </p:blipFill>
+        <p:spPr bwMode="auto">
+          <a:xfrm>
+            <a:off x="4080047" y="271753"/>
+            <a:ext cx="1609146" cy="1609146"/>
+          </a:xfrm>
+          <a:prstGeom prst="rect">
+            <a:avLst/>
+          </a:prstGeom>
+          <a:noFill/>
+          <a:extLst>
+            <a:ext uri="{909E8E84-426E-40DD-AFC4-6F175D3DCCD1}">
+              <a14:hiddenFill xmlns:a14="http://schemas.microsoft.com/office/drawing/2010/main">
+                <a:solidFill>
+                  <a:srgbClr val="FFFFFF"/>
+                </a:solidFill>
+              </a14:hiddenFill>
+            </a:ext>
+          </a:extLst>
+        </p:spPr>
+      </p:pic>
+      <p:pic>
+        <p:nvPicPr>
+          <p:cNvPr id="1032" name="Picture 8" descr="Resultado de imagen para mac os catalina logo&quot;"/>
+          <p:cNvPicPr>
+            <a:picLocks noChangeAspect="1" noChangeArrowheads="1"/>
+          </p:cNvPicPr>
+          <p:nvPr/>
+        </p:nvPicPr>
+        <p:blipFill>
+          <a:blip r:embed="rId4" cstate="print">
+            <a:extLst>
+              <a:ext uri="{28A0092B-C50C-407E-A947-70E740481C1C}">
+                <a14:useLocalDpi xmlns:a14="http://schemas.microsoft.com/office/drawing/2010/main" val="0"/>
+              </a:ext>
+            </a:extLst>
+          </a:blip>
+          <a:srcRect/>
+          <a:stretch>
+            <a:fillRect/>
+          </a:stretch>
+        </p:blipFill>
+        <p:spPr bwMode="auto">
+          <a:xfrm>
+            <a:off x="6817873" y="695173"/>
+            <a:ext cx="803853" cy="803853"/>
+          </a:xfrm>
+          <a:prstGeom prst="rect">
+            <a:avLst/>
+          </a:prstGeom>
+          <a:noFill/>
+          <a:extLst>
+            <a:ext uri="{909E8E84-426E-40DD-AFC4-6F175D3DCCD1}">
+              <a14:hiddenFill xmlns:a14="http://schemas.microsoft.com/office/drawing/2010/main">
+                <a:solidFill>
+                  <a:srgbClr val="FFFFFF"/>
+                </a:solidFill>
+              </a14:hiddenFill>
+            </a:ext>
+          </a:extLst>
+        </p:spPr>
+      </p:pic>
+      <p:sp>
+        <p:nvSpPr>
+          <p:cNvPr id="10" name="CuadroTexto 9"/>
+          <p:cNvSpPr txBox="1"/>
+          <p:nvPr/>
+        </p:nvSpPr>
+        <p:spPr>
+          <a:xfrm>
+            <a:off x="4582378" y="6315419"/>
+            <a:ext cx="3014030" cy="369332"/>
+          </a:xfrm>
+          <a:prstGeom prst="rect">
+            <a:avLst/>
+          </a:prstGeom>
+          <a:noFill/>
+        </p:spPr>
+        <p:txBody>
+          <a:bodyPr wrap="none" rtlCol="0">
+            <a:spAutoFit/>
+          </a:bodyPr>
+          <a:lstStyle/>
+          <a:p>
+            <a:r>
+              <a:rPr lang="es-ES" dirty="0" smtClean="0">
+                <a:solidFill>
+                  <a:srgbClr val="897F66"/>
+                </a:solidFill>
+              </a:rPr>
+              <a:t>Daniel Alejandro Rojas Artiaga</a:t>
+            </a:r>
+            <a:endParaRPr lang="es-MX" dirty="0">
+              <a:solidFill>
+                <a:srgbClr val="897F66"/>
+              </a:solidFill>
+            </a:endParaRPr>
+          </a:p>
+        </p:txBody>
+      </p:sp>
+      <p:sp>
+        <p:nvSpPr>
+          <p:cNvPr id="11" name="CuadroTexto 10"/>
+          <p:cNvSpPr txBox="1"/>
+          <p:nvPr/>
+        </p:nvSpPr>
+        <p:spPr>
+          <a:xfrm>
+            <a:off x="4988324" y="174453"/>
+            <a:ext cx="2215352" cy="523220"/>
+          </a:xfrm>
+          <a:prstGeom prst="rect">
+            <a:avLst/>
+          </a:prstGeom>
+          <a:noFill/>
+        </p:spPr>
+        <p:txBody>
+          <a:bodyPr wrap="square" rtlCol="0">
+            <a:spAutoFit/>
+          </a:bodyPr>
+          <a:lstStyle/>
+          <a:p>
+            <a:r>
+              <a:rPr lang="es-ES" sz="2800" dirty="0" smtClean="0">
+                <a:solidFill>
+                  <a:srgbClr val="E0DDD6"/>
+                </a:solidFill>
+              </a:rPr>
+              <a:t>Quinta Clase</a:t>
+            </a:r>
+            <a:endParaRPr lang="es-MX" sz="2800" dirty="0">
+              <a:solidFill>
+                <a:srgbClr val="E0DDD6"/>
+              </a:solidFill>
+            </a:endParaRPr>
+          </a:p>
+        </p:txBody>
+      </p:sp>
+      <p:sp>
+        <p:nvSpPr>
+          <p:cNvPr id="13" name="Rectángulo 12"/>
+          <p:cNvSpPr/>
+          <p:nvPr/>
+        </p:nvSpPr>
+        <p:spPr>
+          <a:xfrm>
+            <a:off x="1921047" y="1880899"/>
+            <a:ext cx="8336692" cy="2215991"/>
+          </a:xfrm>
+          <a:prstGeom prst="rect">
+            <a:avLst/>
+          </a:prstGeom>
+        </p:spPr>
+        <p:txBody>
+          <a:bodyPr wrap="square">
+            <a:spAutoFit/>
+          </a:bodyPr>
+          <a:lstStyle/>
+          <a:p>
+            <a:pPr algn="ctr"/>
+            <a:r>
+              <a:rPr lang="es-ES" sz="4800" dirty="0" smtClean="0">
+                <a:solidFill>
+                  <a:srgbClr val="E0DDD6"/>
+                </a:solidFill>
+              </a:rPr>
+              <a:t>Tarea</a:t>
+            </a:r>
+            <a:endParaRPr lang="es-ES" sz="4800" dirty="0" smtClean="0">
+              <a:solidFill>
+                <a:srgbClr val="E0DDD6"/>
+              </a:solidFill>
+            </a:endParaRPr>
+          </a:p>
+          <a:p>
+            <a:pPr algn="ctr"/>
+            <a:r>
+              <a:rPr lang="es-ES" sz="3000" dirty="0" smtClean="0">
+                <a:solidFill>
+                  <a:srgbClr val="E0DDD6"/>
+                </a:solidFill>
+              </a:rPr>
+              <a:t>// </a:t>
+            </a:r>
+            <a:r>
+              <a:rPr lang="es-ES" sz="3000" dirty="0">
+                <a:solidFill>
+                  <a:srgbClr val="E0DDD6"/>
+                </a:solidFill>
+              </a:rPr>
+              <a:t>de tarea se les deja buscar los </a:t>
+            </a:r>
+            <a:r>
+              <a:rPr lang="es-ES" sz="3000" dirty="0" smtClean="0">
+                <a:solidFill>
+                  <a:srgbClr val="E0DDD6"/>
+                </a:solidFill>
+              </a:rPr>
+              <a:t>códigos </a:t>
+            </a:r>
+            <a:r>
+              <a:rPr lang="es-ES" sz="3000" dirty="0">
+                <a:solidFill>
+                  <a:srgbClr val="E0DDD6"/>
+                </a:solidFill>
+              </a:rPr>
+              <a:t>mas utilizados en </a:t>
+            </a:r>
+            <a:r>
+              <a:rPr lang="es-ES" sz="3000" dirty="0" err="1" smtClean="0">
+                <a:solidFill>
+                  <a:srgbClr val="E0DDD6"/>
+                </a:solidFill>
+              </a:rPr>
+              <a:t>bash</a:t>
+            </a:r>
+            <a:r>
+              <a:rPr lang="es-ES" sz="3000" dirty="0" smtClean="0">
+                <a:solidFill>
+                  <a:srgbClr val="E0DDD6"/>
+                </a:solidFill>
+              </a:rPr>
+              <a:t>//</a:t>
+            </a:r>
+            <a:endParaRPr lang="es-ES" sz="3000" dirty="0" smtClean="0">
+              <a:solidFill>
+                <a:srgbClr val="E0DDD6"/>
+              </a:solidFill>
+            </a:endParaRPr>
+          </a:p>
+          <a:p>
+            <a:pPr algn="ctr"/>
+            <a:r>
+              <a:rPr lang="es-ES" sz="3000" dirty="0" smtClean="0">
+                <a:solidFill>
+                  <a:srgbClr val="E0DDD6"/>
+                </a:solidFill>
+              </a:rPr>
+              <a:t>//Investigar que es SSH y como conectar//</a:t>
+            </a:r>
+            <a:endParaRPr lang="es-ES" sz="3000" dirty="0" smtClean="0">
+              <a:solidFill>
+                <a:srgbClr val="E0DDD6"/>
+              </a:solidFill>
+            </a:endParaRPr>
+          </a:p>
+        </p:txBody>
+      </p:sp>
+    </p:spTree>
   </p:cSld>
   <p:clrMapOvr>
     <a:masterClrMapping/>
@@ -4757,7 +5742,7 @@
           <p:nvPr/>
         </p:nvPicPr>
         <p:blipFill>
-          <a:blip r:embed="rId2">
+          <a:blip r:embed="rId1">
             <a:extLst>
               <a:ext uri="{28A0092B-C50C-407E-A947-70E740481C1C}">
                 <a14:useLocalDpi xmlns:a14="http://schemas.microsoft.com/office/drawing/2010/main" val="0"/>
@@ -4781,6 +5766,47 @@
       <p:pic>
         <p:nvPicPr>
           <p:cNvPr id="1026" name="Picture 2" descr="Resultado de imagen para linux full hd logo&quot;"/>
+          <p:cNvPicPr>
+            <a:picLocks noChangeAspect="1" noChangeArrowheads="1"/>
+          </p:cNvPicPr>
+          <p:nvPr/>
+        </p:nvPicPr>
+        <p:blipFill>
+          <a:blip r:embed="rId2" cstate="print">
+            <a:extLst>
+              <a:ext uri="{28A0092B-C50C-407E-A947-70E740481C1C}">
+                <a14:useLocalDpi xmlns:a14="http://schemas.microsoft.com/office/drawing/2010/main" val="0"/>
+              </a:ext>
+            </a:extLst>
+          </a:blip>
+          <a:srcRect/>
+          <a:stretch>
+            <a:fillRect/>
+          </a:stretch>
+        </p:blipFill>
+        <p:spPr bwMode="auto">
+          <a:xfrm>
+            <a:off x="5778372" y="695173"/>
+            <a:ext cx="622042" cy="746450"/>
+          </a:xfrm>
+          <a:prstGeom prst="rect">
+            <a:avLst/>
+          </a:prstGeom>
+          <a:noFill/>
+          <a:extLst>
+            <a:ext uri="{909E8E84-426E-40DD-AFC4-6F175D3DCCD1}">
+              <a14:hiddenFill xmlns:a14="http://schemas.microsoft.com/office/drawing/2010/main">
+                <a:solidFill>
+                  <a:srgbClr val="FFFFFF"/>
+                </a:solidFill>
+              </a14:hiddenFill>
+            </a:ext>
+          </a:extLst>
+        </p:spPr>
+      </p:pic>
+      <p:pic>
+        <p:nvPicPr>
+          <p:cNvPr id="1030" name="Picture 6" descr="Resultado de imagen para windows logo hd&quot;"/>
           <p:cNvPicPr>
             <a:picLocks noChangeAspect="1" noChangeArrowheads="1"/>
           </p:cNvPicPr>
@@ -4801,8 +5827,8 @@
         </p:blipFill>
         <p:spPr bwMode="auto">
           <a:xfrm>
-            <a:off x="5778372" y="695173"/>
-            <a:ext cx="622042" cy="746450"/>
+            <a:off x="4080047" y="271753"/>
+            <a:ext cx="1609146" cy="1609146"/>
           </a:xfrm>
           <a:prstGeom prst="rect">
             <a:avLst/>
@@ -4821,7 +5847,7 @@
       </p:pic>
       <p:pic>
         <p:nvPicPr>
-          <p:cNvPr id="1030" name="Picture 6" descr="Resultado de imagen para windows logo hd&quot;"/>
+          <p:cNvPr id="1032" name="Picture 8" descr="Resultado de imagen para mac os catalina logo&quot;"/>
           <p:cNvPicPr>
             <a:picLocks noChangeAspect="1" noChangeArrowheads="1"/>
           </p:cNvPicPr>
@@ -4842,47 +5868,6 @@
         </p:blipFill>
         <p:spPr bwMode="auto">
           <a:xfrm>
-            <a:off x="4080047" y="271753"/>
-            <a:ext cx="1609146" cy="1609146"/>
-          </a:xfrm>
-          <a:prstGeom prst="rect">
-            <a:avLst/>
-          </a:prstGeom>
-          <a:noFill/>
-          <a:extLst>
-            <a:ext uri="{909E8E84-426E-40DD-AFC4-6F175D3DCCD1}">
-              <a14:hiddenFill xmlns:a14="http://schemas.microsoft.com/office/drawing/2010/main">
-                <a:solidFill>
-                  <a:srgbClr val="FFFFFF"/>
-                </a:solidFill>
-              </a14:hiddenFill>
-            </a:ext>
-          </a:extLst>
-        </p:spPr>
-      </p:pic>
-      <p:pic>
-        <p:nvPicPr>
-          <p:cNvPr id="1032" name="Picture 8" descr="Resultado de imagen para mac os catalina logo&quot;"/>
-          <p:cNvPicPr>
-            <a:picLocks noChangeAspect="1" noChangeArrowheads="1"/>
-          </p:cNvPicPr>
-          <p:nvPr/>
-        </p:nvPicPr>
-        <p:blipFill>
-          <a:blip r:embed="rId5" cstate="print">
-            <a:extLst>
-              <a:ext uri="{28A0092B-C50C-407E-A947-70E740481C1C}">
-                <a14:useLocalDpi xmlns:a14="http://schemas.microsoft.com/office/drawing/2010/main" val="0"/>
-              </a:ext>
-            </a:extLst>
-          </a:blip>
-          <a:srcRect/>
-          <a:stretch>
-            <a:fillRect/>
-          </a:stretch>
-        </p:blipFill>
-        <p:spPr bwMode="auto">
-          <a:xfrm>
             <a:off x="6817873" y="695173"/>
             <a:ext cx="803853" cy="803853"/>
           </a:xfrm>
@@ -5016,11 +6001,6 @@
         </p:txBody>
       </p:sp>
     </p:spTree>
-    <p:extLst>
-      <p:ext uri="{BB962C8B-B14F-4D97-AF65-F5344CB8AC3E}">
-        <p14:creationId xmlns:p14="http://schemas.microsoft.com/office/powerpoint/2010/main" val="1371277649"/>
-      </p:ext>
-    </p:extLst>
   </p:cSld>
   <p:clrMapOvr>
     <a:masterClrMapping/>
@@ -5092,7 +6072,7 @@
           <p:nvPr/>
         </p:nvPicPr>
         <p:blipFill>
-          <a:blip r:embed="rId2">
+          <a:blip r:embed="rId1">
             <a:extLst>
               <a:ext uri="{28A0092B-C50C-407E-A947-70E740481C1C}">
                 <a14:useLocalDpi xmlns:a14="http://schemas.microsoft.com/office/drawing/2010/main" val="0"/>
@@ -5116,6 +6096,47 @@
       <p:pic>
         <p:nvPicPr>
           <p:cNvPr id="1026" name="Picture 2" descr="Resultado de imagen para linux full hd logo&quot;"/>
+          <p:cNvPicPr>
+            <a:picLocks noChangeAspect="1" noChangeArrowheads="1"/>
+          </p:cNvPicPr>
+          <p:nvPr/>
+        </p:nvPicPr>
+        <p:blipFill>
+          <a:blip r:embed="rId2" cstate="print">
+            <a:extLst>
+              <a:ext uri="{28A0092B-C50C-407E-A947-70E740481C1C}">
+                <a14:useLocalDpi xmlns:a14="http://schemas.microsoft.com/office/drawing/2010/main" val="0"/>
+              </a:ext>
+            </a:extLst>
+          </a:blip>
+          <a:srcRect/>
+          <a:stretch>
+            <a:fillRect/>
+          </a:stretch>
+        </p:blipFill>
+        <p:spPr bwMode="auto">
+          <a:xfrm>
+            <a:off x="5778372" y="695173"/>
+            <a:ext cx="622042" cy="746450"/>
+          </a:xfrm>
+          <a:prstGeom prst="rect">
+            <a:avLst/>
+          </a:prstGeom>
+          <a:noFill/>
+          <a:extLst>
+            <a:ext uri="{909E8E84-426E-40DD-AFC4-6F175D3DCCD1}">
+              <a14:hiddenFill xmlns:a14="http://schemas.microsoft.com/office/drawing/2010/main">
+                <a:solidFill>
+                  <a:srgbClr val="FFFFFF"/>
+                </a:solidFill>
+              </a14:hiddenFill>
+            </a:ext>
+          </a:extLst>
+        </p:spPr>
+      </p:pic>
+      <p:pic>
+        <p:nvPicPr>
+          <p:cNvPr id="1030" name="Picture 6" descr="Resultado de imagen para windows logo hd&quot;"/>
           <p:cNvPicPr>
             <a:picLocks noChangeAspect="1" noChangeArrowheads="1"/>
           </p:cNvPicPr>
@@ -5136,8 +6157,8 @@
         </p:blipFill>
         <p:spPr bwMode="auto">
           <a:xfrm>
-            <a:off x="5778372" y="695173"/>
-            <a:ext cx="622042" cy="746450"/>
+            <a:off x="4080047" y="271753"/>
+            <a:ext cx="1609146" cy="1609146"/>
           </a:xfrm>
           <a:prstGeom prst="rect">
             <a:avLst/>
@@ -5156,7 +6177,7 @@
       </p:pic>
       <p:pic>
         <p:nvPicPr>
-          <p:cNvPr id="1030" name="Picture 6" descr="Resultado de imagen para windows logo hd&quot;"/>
+          <p:cNvPr id="1032" name="Picture 8" descr="Resultado de imagen para mac os catalina logo&quot;"/>
           <p:cNvPicPr>
             <a:picLocks noChangeAspect="1" noChangeArrowheads="1"/>
           </p:cNvPicPr>
@@ -5177,47 +6198,6 @@
         </p:blipFill>
         <p:spPr bwMode="auto">
           <a:xfrm>
-            <a:off x="4080047" y="271753"/>
-            <a:ext cx="1609146" cy="1609146"/>
-          </a:xfrm>
-          <a:prstGeom prst="rect">
-            <a:avLst/>
-          </a:prstGeom>
-          <a:noFill/>
-          <a:extLst>
-            <a:ext uri="{909E8E84-426E-40DD-AFC4-6F175D3DCCD1}">
-              <a14:hiddenFill xmlns:a14="http://schemas.microsoft.com/office/drawing/2010/main">
-                <a:solidFill>
-                  <a:srgbClr val="FFFFFF"/>
-                </a:solidFill>
-              </a14:hiddenFill>
-            </a:ext>
-          </a:extLst>
-        </p:spPr>
-      </p:pic>
-      <p:pic>
-        <p:nvPicPr>
-          <p:cNvPr id="1032" name="Picture 8" descr="Resultado de imagen para mac os catalina logo&quot;"/>
-          <p:cNvPicPr>
-            <a:picLocks noChangeAspect="1" noChangeArrowheads="1"/>
-          </p:cNvPicPr>
-          <p:nvPr/>
-        </p:nvPicPr>
-        <p:blipFill>
-          <a:blip r:embed="rId5" cstate="print">
-            <a:extLst>
-              <a:ext uri="{28A0092B-C50C-407E-A947-70E740481C1C}">
-                <a14:useLocalDpi xmlns:a14="http://schemas.microsoft.com/office/drawing/2010/main" val="0"/>
-              </a:ext>
-            </a:extLst>
-          </a:blip>
-          <a:srcRect/>
-          <a:stretch>
-            <a:fillRect/>
-          </a:stretch>
-        </p:blipFill>
-        <p:spPr bwMode="auto">
-          <a:xfrm>
             <a:off x="6817873" y="695173"/>
             <a:ext cx="803853" cy="803853"/>
           </a:xfrm>
@@ -5357,6 +6337,11 @@
               </a:rPr>
               <a:t> trabajaran?</a:t>
             </a:r>
+            <a:endParaRPr lang="es-ES" dirty="0" smtClean="0">
+              <a:solidFill>
+                <a:srgbClr val="E0DDD6"/>
+              </a:solidFill>
+            </a:endParaRPr>
           </a:p>
           <a:p>
             <a:r>
@@ -5383,6 +6368,11 @@
               </a:rPr>
               <a:t>?</a:t>
             </a:r>
+            <a:endParaRPr lang="es-ES" dirty="0" smtClean="0">
+              <a:solidFill>
+                <a:srgbClr val="E0DDD6"/>
+              </a:solidFill>
+            </a:endParaRPr>
           </a:p>
           <a:p>
             <a:r>
@@ -5393,6 +6383,11 @@
               </a:rPr>
               <a:t>¿Maquinas virtuales investigadas?</a:t>
             </a:r>
+            <a:endParaRPr lang="es-ES" dirty="0" smtClean="0">
+              <a:solidFill>
+                <a:srgbClr val="E0DDD6"/>
+              </a:solidFill>
+            </a:endParaRPr>
           </a:p>
           <a:p>
             <a:r>
@@ -5428,11 +6423,6 @@
         </p:txBody>
       </p:sp>
     </p:spTree>
-    <p:extLst>
-      <p:ext uri="{BB962C8B-B14F-4D97-AF65-F5344CB8AC3E}">
-        <p14:creationId xmlns:p14="http://schemas.microsoft.com/office/powerpoint/2010/main" val="2962545419"/>
-      </p:ext>
-    </p:extLst>
   </p:cSld>
   <p:clrMapOvr>
     <a:masterClrMapping/>
@@ -5504,7 +6494,7 @@
           <p:nvPr/>
         </p:nvPicPr>
         <p:blipFill>
-          <a:blip r:embed="rId2">
+          <a:blip r:embed="rId1">
             <a:extLst>
               <a:ext uri="{28A0092B-C50C-407E-A947-70E740481C1C}">
                 <a14:useLocalDpi xmlns:a14="http://schemas.microsoft.com/office/drawing/2010/main" val="0"/>
@@ -5528,6 +6518,47 @@
       <p:pic>
         <p:nvPicPr>
           <p:cNvPr id="1026" name="Picture 2" descr="Resultado de imagen para linux full hd logo&quot;"/>
+          <p:cNvPicPr>
+            <a:picLocks noChangeAspect="1" noChangeArrowheads="1"/>
+          </p:cNvPicPr>
+          <p:nvPr/>
+        </p:nvPicPr>
+        <p:blipFill>
+          <a:blip r:embed="rId2" cstate="print">
+            <a:extLst>
+              <a:ext uri="{28A0092B-C50C-407E-A947-70E740481C1C}">
+                <a14:useLocalDpi xmlns:a14="http://schemas.microsoft.com/office/drawing/2010/main" val="0"/>
+              </a:ext>
+            </a:extLst>
+          </a:blip>
+          <a:srcRect/>
+          <a:stretch>
+            <a:fillRect/>
+          </a:stretch>
+        </p:blipFill>
+        <p:spPr bwMode="auto">
+          <a:xfrm>
+            <a:off x="5778372" y="695173"/>
+            <a:ext cx="622042" cy="746450"/>
+          </a:xfrm>
+          <a:prstGeom prst="rect">
+            <a:avLst/>
+          </a:prstGeom>
+          <a:noFill/>
+          <a:extLst>
+            <a:ext uri="{909E8E84-426E-40DD-AFC4-6F175D3DCCD1}">
+              <a14:hiddenFill xmlns:a14="http://schemas.microsoft.com/office/drawing/2010/main">
+                <a:solidFill>
+                  <a:srgbClr val="FFFFFF"/>
+                </a:solidFill>
+              </a14:hiddenFill>
+            </a:ext>
+          </a:extLst>
+        </p:spPr>
+      </p:pic>
+      <p:pic>
+        <p:nvPicPr>
+          <p:cNvPr id="1030" name="Picture 6" descr="Resultado de imagen para windows logo hd&quot;"/>
           <p:cNvPicPr>
             <a:picLocks noChangeAspect="1" noChangeArrowheads="1"/>
           </p:cNvPicPr>
@@ -5548,8 +6579,8 @@
         </p:blipFill>
         <p:spPr bwMode="auto">
           <a:xfrm>
-            <a:off x="5778372" y="695173"/>
-            <a:ext cx="622042" cy="746450"/>
+            <a:off x="4080047" y="271753"/>
+            <a:ext cx="1609146" cy="1609146"/>
           </a:xfrm>
           <a:prstGeom prst="rect">
             <a:avLst/>
@@ -5568,7 +6599,7 @@
       </p:pic>
       <p:pic>
         <p:nvPicPr>
-          <p:cNvPr id="1030" name="Picture 6" descr="Resultado de imagen para windows logo hd&quot;"/>
+          <p:cNvPr id="1032" name="Picture 8" descr="Resultado de imagen para mac os catalina logo&quot;"/>
           <p:cNvPicPr>
             <a:picLocks noChangeAspect="1" noChangeArrowheads="1"/>
           </p:cNvPicPr>
@@ -5589,47 +6620,6 @@
         </p:blipFill>
         <p:spPr bwMode="auto">
           <a:xfrm>
-            <a:off x="4080047" y="271753"/>
-            <a:ext cx="1609146" cy="1609146"/>
-          </a:xfrm>
-          <a:prstGeom prst="rect">
-            <a:avLst/>
-          </a:prstGeom>
-          <a:noFill/>
-          <a:extLst>
-            <a:ext uri="{909E8E84-426E-40DD-AFC4-6F175D3DCCD1}">
-              <a14:hiddenFill xmlns:a14="http://schemas.microsoft.com/office/drawing/2010/main">
-                <a:solidFill>
-                  <a:srgbClr val="FFFFFF"/>
-                </a:solidFill>
-              </a14:hiddenFill>
-            </a:ext>
-          </a:extLst>
-        </p:spPr>
-      </p:pic>
-      <p:pic>
-        <p:nvPicPr>
-          <p:cNvPr id="1032" name="Picture 8" descr="Resultado de imagen para mac os catalina logo&quot;"/>
-          <p:cNvPicPr>
-            <a:picLocks noChangeAspect="1" noChangeArrowheads="1"/>
-          </p:cNvPicPr>
-          <p:nvPr/>
-        </p:nvPicPr>
-        <p:blipFill>
-          <a:blip r:embed="rId5" cstate="print">
-            <a:extLst>
-              <a:ext uri="{28A0092B-C50C-407E-A947-70E740481C1C}">
-                <a14:useLocalDpi xmlns:a14="http://schemas.microsoft.com/office/drawing/2010/main" val="0"/>
-              </a:ext>
-            </a:extLst>
-          </a:blip>
-          <a:srcRect/>
-          <a:stretch>
-            <a:fillRect/>
-          </a:stretch>
-        </p:blipFill>
-        <p:spPr bwMode="auto">
-          <a:xfrm>
             <a:off x="6817873" y="695173"/>
             <a:ext cx="803853" cy="803853"/>
           </a:xfrm>
@@ -5769,6 +6759,11 @@
               </a:rPr>
               <a:t> un SO?</a:t>
             </a:r>
+            <a:endParaRPr lang="es-ES" sz="3000" dirty="0" smtClean="0">
+              <a:solidFill>
+                <a:srgbClr val="E0DDD6"/>
+              </a:solidFill>
+            </a:endParaRPr>
           </a:p>
           <a:p>
             <a:r>
@@ -5834,6 +6829,11 @@
               </a:rPr>
               <a:t> disk drive)</a:t>
             </a:r>
+            <a:endParaRPr lang="es-ES" sz="2000" dirty="0" smtClean="0">
+              <a:solidFill>
+                <a:srgbClr val="E0DDD6"/>
+              </a:solidFill>
+            </a:endParaRPr>
           </a:p>
           <a:p>
             <a:r>
@@ -5852,6 +6852,11 @@
               </a:rPr>
               <a:t> SO.</a:t>
             </a:r>
+            <a:endParaRPr lang="es-ES" sz="2000" dirty="0" smtClean="0">
+              <a:solidFill>
+                <a:srgbClr val="E0DDD6"/>
+              </a:solidFill>
+            </a:endParaRPr>
           </a:p>
           <a:p>
             <a:endParaRPr lang="es-ES" sz="3000" dirty="0">
@@ -5863,11 +6868,6 @@
         </p:txBody>
       </p:sp>
     </p:spTree>
-    <p:extLst>
-      <p:ext uri="{BB962C8B-B14F-4D97-AF65-F5344CB8AC3E}">
-        <p14:creationId xmlns:p14="http://schemas.microsoft.com/office/powerpoint/2010/main" val="2735574451"/>
-      </p:ext>
-    </p:extLst>
   </p:cSld>
   <p:clrMapOvr>
     <a:masterClrMapping/>
@@ -5939,7 +6939,7 @@
           <p:nvPr/>
         </p:nvPicPr>
         <p:blipFill>
-          <a:blip r:embed="rId2">
+          <a:blip r:embed="rId1">
             <a:extLst>
               <a:ext uri="{28A0092B-C50C-407E-A947-70E740481C1C}">
                 <a14:useLocalDpi xmlns:a14="http://schemas.microsoft.com/office/drawing/2010/main" val="0"/>
@@ -5963,6 +6963,47 @@
       <p:pic>
         <p:nvPicPr>
           <p:cNvPr id="1026" name="Picture 2" descr="Resultado de imagen para linux full hd logo&quot;"/>
+          <p:cNvPicPr>
+            <a:picLocks noChangeAspect="1" noChangeArrowheads="1"/>
+          </p:cNvPicPr>
+          <p:nvPr/>
+        </p:nvPicPr>
+        <p:blipFill>
+          <a:blip r:embed="rId2" cstate="print">
+            <a:extLst>
+              <a:ext uri="{28A0092B-C50C-407E-A947-70E740481C1C}">
+                <a14:useLocalDpi xmlns:a14="http://schemas.microsoft.com/office/drawing/2010/main" val="0"/>
+              </a:ext>
+            </a:extLst>
+          </a:blip>
+          <a:srcRect/>
+          <a:stretch>
+            <a:fillRect/>
+          </a:stretch>
+        </p:blipFill>
+        <p:spPr bwMode="auto">
+          <a:xfrm>
+            <a:off x="5778372" y="695173"/>
+            <a:ext cx="622042" cy="746450"/>
+          </a:xfrm>
+          <a:prstGeom prst="rect">
+            <a:avLst/>
+          </a:prstGeom>
+          <a:noFill/>
+          <a:extLst>
+            <a:ext uri="{909E8E84-426E-40DD-AFC4-6F175D3DCCD1}">
+              <a14:hiddenFill xmlns:a14="http://schemas.microsoft.com/office/drawing/2010/main">
+                <a:solidFill>
+                  <a:srgbClr val="FFFFFF"/>
+                </a:solidFill>
+              </a14:hiddenFill>
+            </a:ext>
+          </a:extLst>
+        </p:spPr>
+      </p:pic>
+      <p:pic>
+        <p:nvPicPr>
+          <p:cNvPr id="1030" name="Picture 6" descr="Resultado de imagen para windows logo hd&quot;"/>
           <p:cNvPicPr>
             <a:picLocks noChangeAspect="1" noChangeArrowheads="1"/>
           </p:cNvPicPr>
@@ -5983,8 +7024,8 @@
         </p:blipFill>
         <p:spPr bwMode="auto">
           <a:xfrm>
-            <a:off x="5778372" y="695173"/>
-            <a:ext cx="622042" cy="746450"/>
+            <a:off x="4080047" y="271753"/>
+            <a:ext cx="1609146" cy="1609146"/>
           </a:xfrm>
           <a:prstGeom prst="rect">
             <a:avLst/>
@@ -6003,7 +7044,7 @@
       </p:pic>
       <p:pic>
         <p:nvPicPr>
-          <p:cNvPr id="1030" name="Picture 6" descr="Resultado de imagen para windows logo hd&quot;"/>
+          <p:cNvPr id="1032" name="Picture 8" descr="Resultado de imagen para mac os catalina logo&quot;"/>
           <p:cNvPicPr>
             <a:picLocks noChangeAspect="1" noChangeArrowheads="1"/>
           </p:cNvPicPr>
@@ -6024,47 +7065,6 @@
         </p:blipFill>
         <p:spPr bwMode="auto">
           <a:xfrm>
-            <a:off x="4080047" y="271753"/>
-            <a:ext cx="1609146" cy="1609146"/>
-          </a:xfrm>
-          <a:prstGeom prst="rect">
-            <a:avLst/>
-          </a:prstGeom>
-          <a:noFill/>
-          <a:extLst>
-            <a:ext uri="{909E8E84-426E-40DD-AFC4-6F175D3DCCD1}">
-              <a14:hiddenFill xmlns:a14="http://schemas.microsoft.com/office/drawing/2010/main">
-                <a:solidFill>
-                  <a:srgbClr val="FFFFFF"/>
-                </a:solidFill>
-              </a14:hiddenFill>
-            </a:ext>
-          </a:extLst>
-        </p:spPr>
-      </p:pic>
-      <p:pic>
-        <p:nvPicPr>
-          <p:cNvPr id="1032" name="Picture 8" descr="Resultado de imagen para mac os catalina logo&quot;"/>
-          <p:cNvPicPr>
-            <a:picLocks noChangeAspect="1" noChangeArrowheads="1"/>
-          </p:cNvPicPr>
-          <p:nvPr/>
-        </p:nvPicPr>
-        <p:blipFill>
-          <a:blip r:embed="rId5" cstate="print">
-            <a:extLst>
-              <a:ext uri="{28A0092B-C50C-407E-A947-70E740481C1C}">
-                <a14:useLocalDpi xmlns:a14="http://schemas.microsoft.com/office/drawing/2010/main" val="0"/>
-              </a:ext>
-            </a:extLst>
-          </a:blip>
-          <a:srcRect/>
-          <a:stretch>
-            <a:fillRect/>
-          </a:stretch>
-        </p:blipFill>
-        <p:spPr bwMode="auto">
-          <a:xfrm>
             <a:off x="6817873" y="695173"/>
             <a:ext cx="803853" cy="803853"/>
           </a:xfrm>
@@ -6188,16 +7188,6 @@
               </a:rPr>
               <a:t>Virtual Box      (Este es el nuestro)</a:t>
             </a:r>
-          </a:p>
-          <a:p>
-            <a:r>
-              <a:rPr lang="es-ES" sz="3000" dirty="0" err="1" smtClean="0">
-                <a:solidFill>
-                  <a:srgbClr val="E0DDD6"/>
-                </a:solidFill>
-              </a:rPr>
-              <a:t>VmWare</a:t>
-            </a:r>
             <a:endParaRPr lang="es-ES" sz="3000" dirty="0" smtClean="0">
               <a:solidFill>
                 <a:srgbClr val="E0DDD6"/>
@@ -6211,6 +7201,21 @@
                   <a:srgbClr val="E0DDD6"/>
                 </a:solidFill>
               </a:rPr>
+              <a:t>VmWare</a:t>
+            </a:r>
+            <a:endParaRPr lang="es-ES" sz="3000" dirty="0" smtClean="0">
+              <a:solidFill>
+                <a:srgbClr val="E0DDD6"/>
+              </a:solidFill>
+            </a:endParaRPr>
+          </a:p>
+          <a:p>
+            <a:r>
+              <a:rPr lang="es-ES" sz="3000" dirty="0" err="1" smtClean="0">
+                <a:solidFill>
+                  <a:srgbClr val="E0DDD6"/>
+                </a:solidFill>
+              </a:rPr>
               <a:t>Qemu</a:t>
             </a:r>
             <a:endParaRPr lang="es-ES" sz="3000" dirty="0">
@@ -6222,11 +7227,6 @@
         </p:txBody>
       </p:sp>
     </p:spTree>
-    <p:extLst>
-      <p:ext uri="{BB962C8B-B14F-4D97-AF65-F5344CB8AC3E}">
-        <p14:creationId xmlns:p14="http://schemas.microsoft.com/office/powerpoint/2010/main" val="3373743359"/>
-      </p:ext>
-    </p:extLst>
   </p:cSld>
   <p:clrMapOvr>
     <a:masterClrMapping/>
@@ -6298,7 +7298,7 @@
           <p:nvPr/>
         </p:nvPicPr>
         <p:blipFill>
-          <a:blip r:embed="rId2">
+          <a:blip r:embed="rId1">
             <a:extLst>
               <a:ext uri="{28A0092B-C50C-407E-A947-70E740481C1C}">
                 <a14:useLocalDpi xmlns:a14="http://schemas.microsoft.com/office/drawing/2010/main" val="0"/>
@@ -6322,6 +7322,47 @@
       <p:pic>
         <p:nvPicPr>
           <p:cNvPr id="1026" name="Picture 2" descr="Resultado de imagen para linux full hd logo&quot;"/>
+          <p:cNvPicPr>
+            <a:picLocks noChangeAspect="1" noChangeArrowheads="1"/>
+          </p:cNvPicPr>
+          <p:nvPr/>
+        </p:nvPicPr>
+        <p:blipFill>
+          <a:blip r:embed="rId2" cstate="print">
+            <a:extLst>
+              <a:ext uri="{28A0092B-C50C-407E-A947-70E740481C1C}">
+                <a14:useLocalDpi xmlns:a14="http://schemas.microsoft.com/office/drawing/2010/main" val="0"/>
+              </a:ext>
+            </a:extLst>
+          </a:blip>
+          <a:srcRect/>
+          <a:stretch>
+            <a:fillRect/>
+          </a:stretch>
+        </p:blipFill>
+        <p:spPr bwMode="auto">
+          <a:xfrm>
+            <a:off x="5778372" y="695173"/>
+            <a:ext cx="622042" cy="746450"/>
+          </a:xfrm>
+          <a:prstGeom prst="rect">
+            <a:avLst/>
+          </a:prstGeom>
+          <a:noFill/>
+          <a:extLst>
+            <a:ext uri="{909E8E84-426E-40DD-AFC4-6F175D3DCCD1}">
+              <a14:hiddenFill xmlns:a14="http://schemas.microsoft.com/office/drawing/2010/main">
+                <a:solidFill>
+                  <a:srgbClr val="FFFFFF"/>
+                </a:solidFill>
+              </a14:hiddenFill>
+            </a:ext>
+          </a:extLst>
+        </p:spPr>
+      </p:pic>
+      <p:pic>
+        <p:nvPicPr>
+          <p:cNvPr id="1030" name="Picture 6" descr="Resultado de imagen para windows logo hd&quot;"/>
           <p:cNvPicPr>
             <a:picLocks noChangeAspect="1" noChangeArrowheads="1"/>
           </p:cNvPicPr>
@@ -6342,8 +7383,8 @@
         </p:blipFill>
         <p:spPr bwMode="auto">
           <a:xfrm>
-            <a:off x="5778372" y="695173"/>
-            <a:ext cx="622042" cy="746450"/>
+            <a:off x="4080047" y="271753"/>
+            <a:ext cx="1609146" cy="1609146"/>
           </a:xfrm>
           <a:prstGeom prst="rect">
             <a:avLst/>
@@ -6362,7 +7403,7 @@
       </p:pic>
       <p:pic>
         <p:nvPicPr>
-          <p:cNvPr id="1030" name="Picture 6" descr="Resultado de imagen para windows logo hd&quot;"/>
+          <p:cNvPr id="1032" name="Picture 8" descr="Resultado de imagen para mac os catalina logo&quot;"/>
           <p:cNvPicPr>
             <a:picLocks noChangeAspect="1" noChangeArrowheads="1"/>
           </p:cNvPicPr>
@@ -6383,47 +7424,6 @@
         </p:blipFill>
         <p:spPr bwMode="auto">
           <a:xfrm>
-            <a:off x="4080047" y="271753"/>
-            <a:ext cx="1609146" cy="1609146"/>
-          </a:xfrm>
-          <a:prstGeom prst="rect">
-            <a:avLst/>
-          </a:prstGeom>
-          <a:noFill/>
-          <a:extLst>
-            <a:ext uri="{909E8E84-426E-40DD-AFC4-6F175D3DCCD1}">
-              <a14:hiddenFill xmlns:a14="http://schemas.microsoft.com/office/drawing/2010/main">
-                <a:solidFill>
-                  <a:srgbClr val="FFFFFF"/>
-                </a:solidFill>
-              </a14:hiddenFill>
-            </a:ext>
-          </a:extLst>
-        </p:spPr>
-      </p:pic>
-      <p:pic>
-        <p:nvPicPr>
-          <p:cNvPr id="1032" name="Picture 8" descr="Resultado de imagen para mac os catalina logo&quot;"/>
-          <p:cNvPicPr>
-            <a:picLocks noChangeAspect="1" noChangeArrowheads="1"/>
-          </p:cNvPicPr>
-          <p:nvPr/>
-        </p:nvPicPr>
-        <p:blipFill>
-          <a:blip r:embed="rId5" cstate="print">
-            <a:extLst>
-              <a:ext uri="{28A0092B-C50C-407E-A947-70E740481C1C}">
-                <a14:useLocalDpi xmlns:a14="http://schemas.microsoft.com/office/drawing/2010/main" val="0"/>
-              </a:ext>
-            </a:extLst>
-          </a:blip>
-          <a:srcRect/>
-          <a:stretch>
-            <a:fillRect/>
-          </a:stretch>
-        </p:blipFill>
-        <p:spPr bwMode="auto">
-          <a:xfrm>
             <a:off x="6817873" y="695173"/>
             <a:ext cx="803853" cy="803853"/>
           </a:xfrm>
@@ -6572,11 +7572,6 @@
         </p:txBody>
       </p:sp>
     </p:spTree>
-    <p:extLst>
-      <p:ext uri="{BB962C8B-B14F-4D97-AF65-F5344CB8AC3E}">
-        <p14:creationId xmlns:p14="http://schemas.microsoft.com/office/powerpoint/2010/main" val="3939880355"/>
-      </p:ext>
-    </p:extLst>
   </p:cSld>
   <p:clrMapOvr>
     <a:masterClrMapping/>
@@ -6648,7 +7643,7 @@
           <p:nvPr/>
         </p:nvPicPr>
         <p:blipFill>
-          <a:blip r:embed="rId2">
+          <a:blip r:embed="rId1">
             <a:extLst>
               <a:ext uri="{28A0092B-C50C-407E-A947-70E740481C1C}">
                 <a14:useLocalDpi xmlns:a14="http://schemas.microsoft.com/office/drawing/2010/main" val="0"/>
@@ -6672,6 +7667,47 @@
       <p:pic>
         <p:nvPicPr>
           <p:cNvPr id="1026" name="Picture 2" descr="Resultado de imagen para linux full hd logo&quot;"/>
+          <p:cNvPicPr>
+            <a:picLocks noChangeAspect="1" noChangeArrowheads="1"/>
+          </p:cNvPicPr>
+          <p:nvPr/>
+        </p:nvPicPr>
+        <p:blipFill>
+          <a:blip r:embed="rId2" cstate="print">
+            <a:extLst>
+              <a:ext uri="{28A0092B-C50C-407E-A947-70E740481C1C}">
+                <a14:useLocalDpi xmlns:a14="http://schemas.microsoft.com/office/drawing/2010/main" val="0"/>
+              </a:ext>
+            </a:extLst>
+          </a:blip>
+          <a:srcRect/>
+          <a:stretch>
+            <a:fillRect/>
+          </a:stretch>
+        </p:blipFill>
+        <p:spPr bwMode="auto">
+          <a:xfrm>
+            <a:off x="5778372" y="695173"/>
+            <a:ext cx="622042" cy="746450"/>
+          </a:xfrm>
+          <a:prstGeom prst="rect">
+            <a:avLst/>
+          </a:prstGeom>
+          <a:noFill/>
+          <a:extLst>
+            <a:ext uri="{909E8E84-426E-40DD-AFC4-6F175D3DCCD1}">
+              <a14:hiddenFill xmlns:a14="http://schemas.microsoft.com/office/drawing/2010/main">
+                <a:solidFill>
+                  <a:srgbClr val="FFFFFF"/>
+                </a:solidFill>
+              </a14:hiddenFill>
+            </a:ext>
+          </a:extLst>
+        </p:spPr>
+      </p:pic>
+      <p:pic>
+        <p:nvPicPr>
+          <p:cNvPr id="1030" name="Picture 6" descr="Resultado de imagen para windows logo hd&quot;"/>
           <p:cNvPicPr>
             <a:picLocks noChangeAspect="1" noChangeArrowheads="1"/>
           </p:cNvPicPr>
@@ -6692,8 +7728,8 @@
         </p:blipFill>
         <p:spPr bwMode="auto">
           <a:xfrm>
-            <a:off x="5778372" y="695173"/>
-            <a:ext cx="622042" cy="746450"/>
+            <a:off x="4080047" y="271753"/>
+            <a:ext cx="1609146" cy="1609146"/>
           </a:xfrm>
           <a:prstGeom prst="rect">
             <a:avLst/>
@@ -6712,7 +7748,7 @@
       </p:pic>
       <p:pic>
         <p:nvPicPr>
-          <p:cNvPr id="1030" name="Picture 6" descr="Resultado de imagen para windows logo hd&quot;"/>
+          <p:cNvPr id="1032" name="Picture 8" descr="Resultado de imagen para mac os catalina logo&quot;"/>
           <p:cNvPicPr>
             <a:picLocks noChangeAspect="1" noChangeArrowheads="1"/>
           </p:cNvPicPr>
@@ -6733,47 +7769,6 @@
         </p:blipFill>
         <p:spPr bwMode="auto">
           <a:xfrm>
-            <a:off x="4080047" y="271753"/>
-            <a:ext cx="1609146" cy="1609146"/>
-          </a:xfrm>
-          <a:prstGeom prst="rect">
-            <a:avLst/>
-          </a:prstGeom>
-          <a:noFill/>
-          <a:extLst>
-            <a:ext uri="{909E8E84-426E-40DD-AFC4-6F175D3DCCD1}">
-              <a14:hiddenFill xmlns:a14="http://schemas.microsoft.com/office/drawing/2010/main">
-                <a:solidFill>
-                  <a:srgbClr val="FFFFFF"/>
-                </a:solidFill>
-              </a14:hiddenFill>
-            </a:ext>
-          </a:extLst>
-        </p:spPr>
-      </p:pic>
-      <p:pic>
-        <p:nvPicPr>
-          <p:cNvPr id="1032" name="Picture 8" descr="Resultado de imagen para mac os catalina logo&quot;"/>
-          <p:cNvPicPr>
-            <a:picLocks noChangeAspect="1" noChangeArrowheads="1"/>
-          </p:cNvPicPr>
-          <p:nvPr/>
-        </p:nvPicPr>
-        <p:blipFill>
-          <a:blip r:embed="rId5" cstate="print">
-            <a:extLst>
-              <a:ext uri="{28A0092B-C50C-407E-A947-70E740481C1C}">
-                <a14:useLocalDpi xmlns:a14="http://schemas.microsoft.com/office/drawing/2010/main" val="0"/>
-              </a:ext>
-            </a:extLst>
-          </a:blip>
-          <a:srcRect/>
-          <a:stretch>
-            <a:fillRect/>
-          </a:stretch>
-        </p:blipFill>
-        <p:spPr bwMode="auto">
-          <a:xfrm>
             <a:off x="6817873" y="695173"/>
             <a:ext cx="803853" cy="803853"/>
           </a:xfrm>
@@ -6897,6 +7892,11 @@
               </a:rPr>
               <a:t>¿Que se necesita para instalar Linux?</a:t>
             </a:r>
+            <a:endParaRPr lang="es-ES" sz="3000" dirty="0" smtClean="0">
+              <a:solidFill>
+                <a:srgbClr val="E0DDD6"/>
+              </a:solidFill>
+            </a:endParaRPr>
           </a:p>
           <a:p>
             <a:r>
@@ -6930,24 +7930,6 @@
                 </a:solidFill>
               </a:rPr>
               <a:t>i9-9900</a:t>
-            </a:r>
-          </a:p>
-          <a:p>
-            <a:r>
-              <a:rPr lang="es-ES" sz="2000" dirty="0" smtClean="0">
-                <a:solidFill>
-                  <a:srgbClr val="E0DDD6"/>
-                </a:solidFill>
-              </a:rPr>
-              <a:t>32 Gb de </a:t>
-            </a:r>
-            <a:r>
-              <a:rPr lang="es-ES" sz="2000" dirty="0" err="1" smtClean="0">
-                <a:solidFill>
-                  <a:srgbClr val="E0DDD6"/>
-                </a:solidFill>
-              </a:rPr>
-              <a:t>ram</a:t>
             </a:r>
             <a:endParaRPr lang="es-ES" sz="2000" dirty="0" smtClean="0">
               <a:solidFill>
@@ -6962,7 +7944,7 @@
                   <a:srgbClr val="E0DDD6"/>
                 </a:solidFill>
               </a:rPr>
-              <a:t>8 </a:t>
+              <a:t>32 Gb de </a:t>
             </a:r>
             <a:r>
               <a:rPr lang="es-ES" sz="2000" dirty="0" err="1" smtClean="0">
@@ -6970,33 +7952,7 @@
                   <a:srgbClr val="E0DDD6"/>
                 </a:solidFill>
               </a:rPr>
-              <a:t>gb</a:t>
-            </a:r>
-            <a:r>
-              <a:rPr lang="es-ES" sz="2000" dirty="0" smtClean="0">
-                <a:solidFill>
-                  <a:srgbClr val="E0DDD6"/>
-                </a:solidFill>
-              </a:rPr>
-              <a:t> dedicados de video</a:t>
-            </a:r>
-          </a:p>
-          <a:p>
-            <a:r>
-              <a:rPr lang="es-ES" sz="2000" dirty="0" smtClean="0">
-                <a:solidFill>
-                  <a:srgbClr val="E0DDD6"/>
-                </a:solidFill>
-              </a:rPr>
-              <a:t>1.21 </a:t>
-            </a:r>
-            <a:r>
-              <a:rPr lang="es-ES" sz="2000" dirty="0" err="1" smtClean="0">
-                <a:solidFill>
-                  <a:srgbClr val="E0DDD6"/>
-                </a:solidFill>
-              </a:rPr>
-              <a:t>Gigawatts</a:t>
+              <a:t>ram</a:t>
             </a:r>
             <a:endParaRPr lang="es-ES" sz="2000" dirty="0" smtClean="0">
               <a:solidFill>
@@ -7011,17 +7967,71 @@
                   <a:srgbClr val="E0DDD6"/>
                 </a:solidFill>
               </a:rPr>
+              <a:t>8 </a:t>
+            </a:r>
+            <a:r>
+              <a:rPr lang="es-ES" sz="2000" dirty="0" err="1" smtClean="0">
+                <a:solidFill>
+                  <a:srgbClr val="E0DDD6"/>
+                </a:solidFill>
+              </a:rPr>
+              <a:t>gb</a:t>
+            </a:r>
+            <a:r>
+              <a:rPr lang="es-ES" sz="2000" dirty="0" smtClean="0">
+                <a:solidFill>
+                  <a:srgbClr val="E0DDD6"/>
+                </a:solidFill>
+              </a:rPr>
+              <a:t> dedicados de video</a:t>
+            </a:r>
+            <a:endParaRPr lang="es-ES" sz="2000" dirty="0" smtClean="0">
+              <a:solidFill>
+                <a:srgbClr val="E0DDD6"/>
+              </a:solidFill>
+            </a:endParaRPr>
+          </a:p>
+          <a:p>
+            <a:r>
+              <a:rPr lang="es-ES" sz="2000" dirty="0" smtClean="0">
+                <a:solidFill>
+                  <a:srgbClr val="E0DDD6"/>
+                </a:solidFill>
+              </a:rPr>
+              <a:t>1.21 </a:t>
+            </a:r>
+            <a:r>
+              <a:rPr lang="es-ES" sz="2000" dirty="0" err="1" smtClean="0">
+                <a:solidFill>
+                  <a:srgbClr val="E0DDD6"/>
+                </a:solidFill>
+              </a:rPr>
+              <a:t>Gigawatts</a:t>
+            </a:r>
+            <a:endParaRPr lang="es-ES" sz="2000" dirty="0" smtClean="0">
+              <a:solidFill>
+                <a:srgbClr val="E0DDD6"/>
+              </a:solidFill>
+            </a:endParaRPr>
+          </a:p>
+          <a:p>
+            <a:r>
+              <a:rPr lang="es-ES" sz="2000" dirty="0" smtClean="0">
+                <a:solidFill>
+                  <a:srgbClr val="E0DDD6"/>
+                </a:solidFill>
+              </a:rPr>
               <a:t>1 condensador de flujo</a:t>
             </a:r>
+            <a:endParaRPr lang="es-ES" sz="2000" dirty="0" smtClean="0">
+              <a:solidFill>
+                <a:srgbClr val="E0DDD6"/>
+              </a:solidFill>
+            </a:endParaRPr>
           </a:p>
         </p:txBody>
       </p:sp>
     </p:spTree>
-    <p:extLst>
-      <p:ext uri="{BB962C8B-B14F-4D97-AF65-F5344CB8AC3E}">
-        <p14:creationId xmlns:p14="http://schemas.microsoft.com/office/powerpoint/2010/main" val="3584853102"/>
-      </p:ext>
-    </p:extLst>
   </p:cSld>
   <p:clrMapOvr>
     <a:masterClrMapping/>
@@ -7093,7 +8103,7 @@
           <p:nvPr/>
         </p:nvPicPr>
         <p:blipFill>
-          <a:blip r:embed="rId2">
+          <a:blip r:embed="rId1">
             <a:extLst>
               <a:ext uri="{28A0092B-C50C-407E-A947-70E740481C1C}">
                 <a14:useLocalDpi xmlns:a14="http://schemas.microsoft.com/office/drawing/2010/main" val="0"/>
@@ -7117,6 +8127,47 @@
       <p:pic>
         <p:nvPicPr>
           <p:cNvPr id="1026" name="Picture 2" descr="Resultado de imagen para linux full hd logo&quot;"/>
+          <p:cNvPicPr>
+            <a:picLocks noChangeAspect="1" noChangeArrowheads="1"/>
+          </p:cNvPicPr>
+          <p:nvPr/>
+        </p:nvPicPr>
+        <p:blipFill>
+          <a:blip r:embed="rId2" cstate="print">
+            <a:extLst>
+              <a:ext uri="{28A0092B-C50C-407E-A947-70E740481C1C}">
+                <a14:useLocalDpi xmlns:a14="http://schemas.microsoft.com/office/drawing/2010/main" val="0"/>
+              </a:ext>
+            </a:extLst>
+          </a:blip>
+          <a:srcRect/>
+          <a:stretch>
+            <a:fillRect/>
+          </a:stretch>
+        </p:blipFill>
+        <p:spPr bwMode="auto">
+          <a:xfrm>
+            <a:off x="5778372" y="695173"/>
+            <a:ext cx="622042" cy="746450"/>
+          </a:xfrm>
+          <a:prstGeom prst="rect">
+            <a:avLst/>
+          </a:prstGeom>
+          <a:noFill/>
+          <a:extLst>
+            <a:ext uri="{909E8E84-426E-40DD-AFC4-6F175D3DCCD1}">
+              <a14:hiddenFill xmlns:a14="http://schemas.microsoft.com/office/drawing/2010/main">
+                <a:solidFill>
+                  <a:srgbClr val="FFFFFF"/>
+                </a:solidFill>
+              </a14:hiddenFill>
+            </a:ext>
+          </a:extLst>
+        </p:spPr>
+      </p:pic>
+      <p:pic>
+        <p:nvPicPr>
+          <p:cNvPr id="1030" name="Picture 6" descr="Resultado de imagen para windows logo hd&quot;"/>
           <p:cNvPicPr>
             <a:picLocks noChangeAspect="1" noChangeArrowheads="1"/>
           </p:cNvPicPr>
@@ -7137,8 +8188,8 @@
         </p:blipFill>
         <p:spPr bwMode="auto">
           <a:xfrm>
-            <a:off x="5778372" y="695173"/>
-            <a:ext cx="622042" cy="746450"/>
+            <a:off x="4080047" y="271753"/>
+            <a:ext cx="1609146" cy="1609146"/>
           </a:xfrm>
           <a:prstGeom prst="rect">
             <a:avLst/>
@@ -7157,7 +8208,7 @@
       </p:pic>
       <p:pic>
         <p:nvPicPr>
-          <p:cNvPr id="1030" name="Picture 6" descr="Resultado de imagen para windows logo hd&quot;"/>
+          <p:cNvPr id="1032" name="Picture 8" descr="Resultado de imagen para mac os catalina logo&quot;"/>
           <p:cNvPicPr>
             <a:picLocks noChangeAspect="1" noChangeArrowheads="1"/>
           </p:cNvPicPr>
@@ -7178,47 +8229,6 @@
         </p:blipFill>
         <p:spPr bwMode="auto">
           <a:xfrm>
-            <a:off x="4080047" y="271753"/>
-            <a:ext cx="1609146" cy="1609146"/>
-          </a:xfrm>
-          <a:prstGeom prst="rect">
-            <a:avLst/>
-          </a:prstGeom>
-          <a:noFill/>
-          <a:extLst>
-            <a:ext uri="{909E8E84-426E-40DD-AFC4-6F175D3DCCD1}">
-              <a14:hiddenFill xmlns:a14="http://schemas.microsoft.com/office/drawing/2010/main">
-                <a:solidFill>
-                  <a:srgbClr val="FFFFFF"/>
-                </a:solidFill>
-              </a14:hiddenFill>
-            </a:ext>
-          </a:extLst>
-        </p:spPr>
-      </p:pic>
-      <p:pic>
-        <p:nvPicPr>
-          <p:cNvPr id="1032" name="Picture 8" descr="Resultado de imagen para mac os catalina logo&quot;"/>
-          <p:cNvPicPr>
-            <a:picLocks noChangeAspect="1" noChangeArrowheads="1"/>
-          </p:cNvPicPr>
-          <p:nvPr/>
-        </p:nvPicPr>
-        <p:blipFill>
-          <a:blip r:embed="rId5" cstate="print">
-            <a:extLst>
-              <a:ext uri="{28A0092B-C50C-407E-A947-70E740481C1C}">
-                <a14:useLocalDpi xmlns:a14="http://schemas.microsoft.com/office/drawing/2010/main" val="0"/>
-              </a:ext>
-            </a:extLst>
-          </a:blip>
-          <a:srcRect/>
-          <a:stretch>
-            <a:fillRect/>
-          </a:stretch>
-        </p:blipFill>
-        <p:spPr bwMode="auto">
-          <a:xfrm>
             <a:off x="6817873" y="695173"/>
             <a:ext cx="803853" cy="803853"/>
           </a:xfrm>
@@ -7342,6 +8352,11 @@
               </a:rPr>
               <a:t>¿Que se necesita para instalar Linux?</a:t>
             </a:r>
+            <a:endParaRPr lang="es-ES" sz="3000" dirty="0" smtClean="0">
+              <a:solidFill>
+                <a:srgbClr val="E0DDD6"/>
+              </a:solidFill>
+            </a:endParaRPr>
           </a:p>
           <a:p>
             <a:r>
@@ -7352,6 +8367,11 @@
               </a:rPr>
               <a:t>Espacio en el disco duro</a:t>
             </a:r>
+            <a:endParaRPr lang="es-ES" sz="2000" dirty="0" smtClean="0">
+              <a:solidFill>
+                <a:srgbClr val="E0DDD6"/>
+              </a:solidFill>
+            </a:endParaRPr>
           </a:p>
           <a:p>
             <a:r>
@@ -7362,6 +8382,11 @@
               </a:rPr>
               <a:t>Cumplir con los requerimientos básicos</a:t>
             </a:r>
+            <a:endParaRPr lang="es-ES" sz="2000" dirty="0" smtClean="0">
+              <a:solidFill>
+                <a:srgbClr val="E0DDD6"/>
+              </a:solidFill>
+            </a:endParaRPr>
           </a:p>
           <a:p>
             <a:r>
@@ -7372,15 +8397,15 @@
               </a:rPr>
               <a:t>Conexión a internet</a:t>
             </a:r>
+            <a:endParaRPr lang="es-ES" sz="2000" dirty="0" smtClean="0">
+              <a:solidFill>
+                <a:srgbClr val="E0DDD6"/>
+              </a:solidFill>
+            </a:endParaRPr>
           </a:p>
         </p:txBody>
       </p:sp>
     </p:spTree>
-    <p:extLst>
-      <p:ext uri="{BB962C8B-B14F-4D97-AF65-F5344CB8AC3E}">
-        <p14:creationId xmlns:p14="http://schemas.microsoft.com/office/powerpoint/2010/main" val="3071902081"/>
-      </p:ext>
-    </p:extLst>
   </p:cSld>
   <p:clrMapOvr>
     <a:masterClrMapping/>
@@ -7452,7 +8477,7 @@
           <p:nvPr/>
         </p:nvPicPr>
         <p:blipFill>
-          <a:blip r:embed="rId2">
+          <a:blip r:embed="rId1">
             <a:extLst>
               <a:ext uri="{28A0092B-C50C-407E-A947-70E740481C1C}">
                 <a14:useLocalDpi xmlns:a14="http://schemas.microsoft.com/office/drawing/2010/main" val="0"/>
@@ -7476,6 +8501,47 @@
       <p:pic>
         <p:nvPicPr>
           <p:cNvPr id="1026" name="Picture 2" descr="Resultado de imagen para linux full hd logo&quot;"/>
+          <p:cNvPicPr>
+            <a:picLocks noChangeAspect="1" noChangeArrowheads="1"/>
+          </p:cNvPicPr>
+          <p:nvPr/>
+        </p:nvPicPr>
+        <p:blipFill>
+          <a:blip r:embed="rId2" cstate="print">
+            <a:extLst>
+              <a:ext uri="{28A0092B-C50C-407E-A947-70E740481C1C}">
+                <a14:useLocalDpi xmlns:a14="http://schemas.microsoft.com/office/drawing/2010/main" val="0"/>
+              </a:ext>
+            </a:extLst>
+          </a:blip>
+          <a:srcRect/>
+          <a:stretch>
+            <a:fillRect/>
+          </a:stretch>
+        </p:blipFill>
+        <p:spPr bwMode="auto">
+          <a:xfrm>
+            <a:off x="5778372" y="695173"/>
+            <a:ext cx="622042" cy="746450"/>
+          </a:xfrm>
+          <a:prstGeom prst="rect">
+            <a:avLst/>
+          </a:prstGeom>
+          <a:noFill/>
+          <a:extLst>
+            <a:ext uri="{909E8E84-426E-40DD-AFC4-6F175D3DCCD1}">
+              <a14:hiddenFill xmlns:a14="http://schemas.microsoft.com/office/drawing/2010/main">
+                <a:solidFill>
+                  <a:srgbClr val="FFFFFF"/>
+                </a:solidFill>
+              </a14:hiddenFill>
+            </a:ext>
+          </a:extLst>
+        </p:spPr>
+      </p:pic>
+      <p:pic>
+        <p:nvPicPr>
+          <p:cNvPr id="1030" name="Picture 6" descr="Resultado de imagen para windows logo hd&quot;"/>
           <p:cNvPicPr>
             <a:picLocks noChangeAspect="1" noChangeArrowheads="1"/>
           </p:cNvPicPr>
@@ -7496,8 +8562,8 @@
         </p:blipFill>
         <p:spPr bwMode="auto">
           <a:xfrm>
-            <a:off x="5778372" y="695173"/>
-            <a:ext cx="622042" cy="746450"/>
+            <a:off x="4080047" y="271753"/>
+            <a:ext cx="1609146" cy="1609146"/>
           </a:xfrm>
           <a:prstGeom prst="rect">
             <a:avLst/>
@@ -7516,7 +8582,7 @@
       </p:pic>
       <p:pic>
         <p:nvPicPr>
-          <p:cNvPr id="1030" name="Picture 6" descr="Resultado de imagen para windows logo hd&quot;"/>
+          <p:cNvPr id="1032" name="Picture 8" descr="Resultado de imagen para mac os catalina logo&quot;"/>
           <p:cNvPicPr>
             <a:picLocks noChangeAspect="1" noChangeArrowheads="1"/>
           </p:cNvPicPr>
@@ -7537,47 +8603,6 @@
         </p:blipFill>
         <p:spPr bwMode="auto">
           <a:xfrm>
-            <a:off x="4080047" y="271753"/>
-            <a:ext cx="1609146" cy="1609146"/>
-          </a:xfrm>
-          <a:prstGeom prst="rect">
-            <a:avLst/>
-          </a:prstGeom>
-          <a:noFill/>
-          <a:extLst>
-            <a:ext uri="{909E8E84-426E-40DD-AFC4-6F175D3DCCD1}">
-              <a14:hiddenFill xmlns:a14="http://schemas.microsoft.com/office/drawing/2010/main">
-                <a:solidFill>
-                  <a:srgbClr val="FFFFFF"/>
-                </a:solidFill>
-              </a14:hiddenFill>
-            </a:ext>
-          </a:extLst>
-        </p:spPr>
-      </p:pic>
-      <p:pic>
-        <p:nvPicPr>
-          <p:cNvPr id="1032" name="Picture 8" descr="Resultado de imagen para mac os catalina logo&quot;"/>
-          <p:cNvPicPr>
-            <a:picLocks noChangeAspect="1" noChangeArrowheads="1"/>
-          </p:cNvPicPr>
-          <p:nvPr/>
-        </p:nvPicPr>
-        <p:blipFill>
-          <a:blip r:embed="rId5" cstate="print">
-            <a:extLst>
-              <a:ext uri="{28A0092B-C50C-407E-A947-70E740481C1C}">
-                <a14:useLocalDpi xmlns:a14="http://schemas.microsoft.com/office/drawing/2010/main" val="0"/>
-              </a:ext>
-            </a:extLst>
-          </a:blip>
-          <a:srcRect/>
-          <a:stretch>
-            <a:fillRect/>
-          </a:stretch>
-        </p:blipFill>
-        <p:spPr bwMode="auto">
-          <a:xfrm>
             <a:off x="6817873" y="695173"/>
             <a:ext cx="803853" cy="803853"/>
           </a:xfrm>
@@ -7702,6 +8727,11 @@
               </a:rPr>
               <a:t>Particionar disco duro </a:t>
             </a:r>
+            <a:endParaRPr lang="es-ES" sz="3000" dirty="0" smtClean="0">
+              <a:solidFill>
+                <a:srgbClr val="E0DDD6"/>
+              </a:solidFill>
+            </a:endParaRPr>
           </a:p>
           <a:p>
             <a:pPr algn="ctr"/>
@@ -7713,6 +8743,11 @@
               </a:rPr>
               <a:t>(el paso mas importante y peligroso)</a:t>
             </a:r>
+            <a:endParaRPr lang="es-ES" sz="1500" dirty="0" smtClean="0">
+              <a:solidFill>
+                <a:srgbClr val="E0DDD6"/>
+              </a:solidFill>
+            </a:endParaRPr>
           </a:p>
           <a:p>
             <a:pPr algn="just"/>
@@ -7732,6 +8767,11 @@
               </a:rPr>
               <a:t>Se necesitan 3 particiones</a:t>
             </a:r>
+            <a:endParaRPr lang="es-ES" sz="2000" dirty="0" smtClean="0">
+              <a:solidFill>
+                <a:srgbClr val="E0DDD6"/>
+              </a:solidFill>
+            </a:endParaRPr>
           </a:p>
           <a:p>
             <a:pPr algn="just"/>
@@ -7743,6 +8783,11 @@
               </a:rPr>
               <a:t>1.- de datos en formato ext (1-4).</a:t>
             </a:r>
+            <a:endParaRPr lang="es-ES" sz="2000" dirty="0" smtClean="0">
+              <a:solidFill>
+                <a:srgbClr val="E0DDD6"/>
+              </a:solidFill>
+            </a:endParaRPr>
           </a:p>
           <a:p>
             <a:pPr algn="just"/>
@@ -7754,6 +8799,11 @@
               </a:rPr>
               <a:t>2.- swap.</a:t>
             </a:r>
+            <a:endParaRPr lang="es-ES" sz="2000" dirty="0" smtClean="0">
+              <a:solidFill>
+                <a:srgbClr val="E0DDD6"/>
+              </a:solidFill>
+            </a:endParaRPr>
           </a:p>
           <a:p>
             <a:pPr algn="just"/>
@@ -7790,11 +8840,6 @@
         </p:txBody>
       </p:sp>
     </p:spTree>
-    <p:extLst>
-      <p:ext uri="{BB962C8B-B14F-4D97-AF65-F5344CB8AC3E}">
-        <p14:creationId xmlns:p14="http://schemas.microsoft.com/office/powerpoint/2010/main" val="2766053626"/>
-      </p:ext>
-    </p:extLst>
   </p:cSld>
   <p:clrMapOvr>
     <a:masterClrMapping/>
@@ -7845,7 +8890,7 @@
     </a:clrScheme>
     <a:fontScheme name="Office">
       <a:majorFont>
-        <a:latin typeface="Calibri Light" panose="020F0302020204030204"/>
+        <a:latin typeface="Calibri Light"/>
         <a:ea typeface=""/>
         <a:cs typeface=""/>
         <a:font script="Jpan" typeface="ＭＳ Ｐゴシック"/>
@@ -7880,7 +8925,7 @@
         <a:font script="Geor" typeface="Sylfaen"/>
       </a:majorFont>
       <a:minorFont>
-        <a:latin typeface="Calibri" panose="020F0502020204030204"/>
+        <a:latin typeface="Calibri"/>
         <a:ea typeface=""/>
         <a:cs typeface=""/>
         <a:font script="Jpan" typeface="ＭＳ Ｐゴシック"/>
@@ -8053,8 +9098,6 @@
       </a:bgFillStyleLst>
     </a:fmtScheme>
   </a:themeElements>
-  <a:objectDefaults/>
-  <a:extraClrSchemeLst/>
   <a:extLst>
     <a:ext uri="{05A4C25C-085E-4340-85A3-A5531E510DB2}">
       <thm15:themeFamily xmlns:thm15="http://schemas.microsoft.com/office/thememl/2012/main" name="Office Theme" id="{62F939B6-93AF-4DB8-9C6B-D6C7DFDC589F}" vid="{4A3C46E8-61CC-4603-A589-7422A47A8E4A}"/>

</xml_diff>